<commit_message>
Add new logic to Flowcharts
</commit_message>
<xml_diff>
--- a/Software/Software System Architecture.pptx
+++ b/Software/Software System Architecture.pptx
@@ -10,7 +10,8 @@
     <p:sldId id="260" r:id="rId4"/>
     <p:sldId id="261" r:id="rId5"/>
     <p:sldId id="262" r:id="rId6"/>
-    <p:sldId id="257" r:id="rId7"/>
+    <p:sldId id="263" r:id="rId7"/>
+    <p:sldId id="257" r:id="rId8"/>
   </p:sldIdLst>
   <p:sldSz cx="21945600" cy="16459200"/>
   <p:notesSz cx="6858000" cy="9144000"/>
@@ -119,6 +120,7 @@
             <p14:sldId id="260"/>
             <p14:sldId id="261"/>
             <p14:sldId id="262"/>
+            <p14:sldId id="263"/>
             <p14:sldId id="257"/>
           </p14:sldIdLst>
         </p14:section>
@@ -262,7 +264,7 @@
           <a:p>
             <a:fld id="{F62E71A9-A198-4BC2-915B-5C3ABADD511E}" type="datetimeFigureOut">
               <a:rPr lang="en-US" smtClean="0"/>
-              <a:t>9/26/2019</a:t>
+              <a:t>10/3/2019</a:t>
             </a:fld>
             <a:endParaRPr lang="en-US"/>
           </a:p>
@@ -432,7 +434,7 @@
           <a:p>
             <a:fld id="{F62E71A9-A198-4BC2-915B-5C3ABADD511E}" type="datetimeFigureOut">
               <a:rPr lang="en-US" smtClean="0"/>
-              <a:t>9/26/2019</a:t>
+              <a:t>10/3/2019</a:t>
             </a:fld>
             <a:endParaRPr lang="en-US"/>
           </a:p>
@@ -612,7 +614,7 @@
           <a:p>
             <a:fld id="{F62E71A9-A198-4BC2-915B-5C3ABADD511E}" type="datetimeFigureOut">
               <a:rPr lang="en-US" smtClean="0"/>
-              <a:t>9/26/2019</a:t>
+              <a:t>10/3/2019</a:t>
             </a:fld>
             <a:endParaRPr lang="en-US"/>
           </a:p>
@@ -782,7 +784,7 @@
           <a:p>
             <a:fld id="{F62E71A9-A198-4BC2-915B-5C3ABADD511E}" type="datetimeFigureOut">
               <a:rPr lang="en-US" smtClean="0"/>
-              <a:t>9/26/2019</a:t>
+              <a:t>10/3/2019</a:t>
             </a:fld>
             <a:endParaRPr lang="en-US"/>
           </a:p>
@@ -1026,7 +1028,7 @@
           <a:p>
             <a:fld id="{F62E71A9-A198-4BC2-915B-5C3ABADD511E}" type="datetimeFigureOut">
               <a:rPr lang="en-US" smtClean="0"/>
-              <a:t>9/26/2019</a:t>
+              <a:t>10/3/2019</a:t>
             </a:fld>
             <a:endParaRPr lang="en-US"/>
           </a:p>
@@ -1258,7 +1260,7 @@
           <a:p>
             <a:fld id="{F62E71A9-A198-4BC2-915B-5C3ABADD511E}" type="datetimeFigureOut">
               <a:rPr lang="en-US" smtClean="0"/>
-              <a:t>9/26/2019</a:t>
+              <a:t>10/3/2019</a:t>
             </a:fld>
             <a:endParaRPr lang="en-US"/>
           </a:p>
@@ -1625,7 +1627,7 @@
           <a:p>
             <a:fld id="{F62E71A9-A198-4BC2-915B-5C3ABADD511E}" type="datetimeFigureOut">
               <a:rPr lang="en-US" smtClean="0"/>
-              <a:t>9/26/2019</a:t>
+              <a:t>10/3/2019</a:t>
             </a:fld>
             <a:endParaRPr lang="en-US"/>
           </a:p>
@@ -1743,7 +1745,7 @@
           <a:p>
             <a:fld id="{F62E71A9-A198-4BC2-915B-5C3ABADD511E}" type="datetimeFigureOut">
               <a:rPr lang="en-US" smtClean="0"/>
-              <a:t>9/26/2019</a:t>
+              <a:t>10/3/2019</a:t>
             </a:fld>
             <a:endParaRPr lang="en-US"/>
           </a:p>
@@ -1838,7 +1840,7 @@
           <a:p>
             <a:fld id="{F62E71A9-A198-4BC2-915B-5C3ABADD511E}" type="datetimeFigureOut">
               <a:rPr lang="en-US" smtClean="0"/>
-              <a:t>9/26/2019</a:t>
+              <a:t>10/3/2019</a:t>
             </a:fld>
             <a:endParaRPr lang="en-US"/>
           </a:p>
@@ -2115,7 +2117,7 @@
           <a:p>
             <a:fld id="{F62E71A9-A198-4BC2-915B-5C3ABADD511E}" type="datetimeFigureOut">
               <a:rPr lang="en-US" smtClean="0"/>
-              <a:t>9/26/2019</a:t>
+              <a:t>10/3/2019</a:t>
             </a:fld>
             <a:endParaRPr lang="en-US"/>
           </a:p>
@@ -2372,7 +2374,7 @@
           <a:p>
             <a:fld id="{F62E71A9-A198-4BC2-915B-5C3ABADD511E}" type="datetimeFigureOut">
               <a:rPr lang="en-US" smtClean="0"/>
-              <a:t>9/26/2019</a:t>
+              <a:t>10/3/2019</a:t>
             </a:fld>
             <a:endParaRPr lang="en-US"/>
           </a:p>
@@ -2585,7 +2587,7 @@
           <a:p>
             <a:fld id="{F62E71A9-A198-4BC2-915B-5C3ABADD511E}" type="datetimeFigureOut">
               <a:rPr lang="en-US" smtClean="0"/>
-              <a:t>9/26/2019</a:t>
+              <a:t>10/3/2019</a:t>
             </a:fld>
             <a:endParaRPr lang="en-US"/>
           </a:p>
@@ -13779,6 +13781,142 @@
           </a:fontRef>
         </p:style>
       </p:cxnSp>
+      <p:sp>
+        <p:nvSpPr>
+          <p:cNvPr id="2" name="Rectangle 1">
+            <a:extLst>
+              <a:ext uri="{FF2B5EF4-FFF2-40B4-BE49-F238E27FC236}">
+                <a16:creationId xmlns:a16="http://schemas.microsoft.com/office/drawing/2014/main" id="{5C473EEA-EEEE-4804-BD65-1F632981F08E}"/>
+              </a:ext>
+            </a:extLst>
+          </p:cNvPr>
+          <p:cNvSpPr/>
+          <p:nvPr/>
+        </p:nvSpPr>
+        <p:spPr>
+          <a:xfrm>
+            <a:off x="595423" y="467833"/>
+            <a:ext cx="21009935" cy="14949376"/>
+          </a:xfrm>
+          <a:prstGeom prst="rect">
+            <a:avLst/>
+          </a:prstGeom>
+          <a:noFill/>
+          <a:ln w="76200">
+            <a:solidFill>
+              <a:schemeClr val="tx1"/>
+            </a:solidFill>
+          </a:ln>
+        </p:spPr>
+        <p:style>
+          <a:lnRef idx="2">
+            <a:schemeClr val="accent1">
+              <a:shade val="50000"/>
+            </a:schemeClr>
+          </a:lnRef>
+          <a:fillRef idx="1">
+            <a:schemeClr val="accent1"/>
+          </a:fillRef>
+          <a:effectRef idx="0">
+            <a:schemeClr val="accent1"/>
+          </a:effectRef>
+          <a:fontRef idx="minor">
+            <a:schemeClr val="lt1"/>
+          </a:fontRef>
+        </p:style>
+        <p:txBody>
+          <a:bodyPr rtlCol="0" anchor="ctr"/>
+          <a:lstStyle/>
+          <a:p>
+            <a:pPr algn="ctr"/>
+            <a:endParaRPr lang="en-US"/>
+          </a:p>
+        </p:txBody>
+      </p:sp>
+      <p:cxnSp>
+        <p:nvCxnSpPr>
+          <p:cNvPr id="4" name="Straight Connector 3">
+            <a:extLst>
+              <a:ext uri="{FF2B5EF4-FFF2-40B4-BE49-F238E27FC236}">
+                <a16:creationId xmlns:a16="http://schemas.microsoft.com/office/drawing/2014/main" id="{1C0CDB29-A45F-4980-88F2-84BC37508491}"/>
+              </a:ext>
+            </a:extLst>
+          </p:cNvPr>
+          <p:cNvCxnSpPr/>
+          <p:nvPr/>
+        </p:nvCxnSpPr>
+        <p:spPr>
+          <a:xfrm>
+            <a:off x="595423" y="467833"/>
+            <a:ext cx="21009935" cy="14949376"/>
+          </a:xfrm>
+          <a:prstGeom prst="line">
+            <a:avLst/>
+          </a:prstGeom>
+          <a:ln w="76200">
+            <a:solidFill>
+              <a:srgbClr val="FF0000"/>
+            </a:solidFill>
+          </a:ln>
+        </p:spPr>
+        <p:style>
+          <a:lnRef idx="1">
+            <a:schemeClr val="accent1"/>
+          </a:lnRef>
+          <a:fillRef idx="0">
+            <a:schemeClr val="accent1"/>
+          </a:fillRef>
+          <a:effectRef idx="0">
+            <a:schemeClr val="accent1"/>
+          </a:effectRef>
+          <a:fontRef idx="minor">
+            <a:schemeClr val="tx1"/>
+          </a:fontRef>
+        </p:style>
+      </p:cxnSp>
+      <p:cxnSp>
+        <p:nvCxnSpPr>
+          <p:cNvPr id="60" name="Straight Connector 59">
+            <a:extLst>
+              <a:ext uri="{FF2B5EF4-FFF2-40B4-BE49-F238E27FC236}">
+                <a16:creationId xmlns:a16="http://schemas.microsoft.com/office/drawing/2014/main" id="{C9B07648-FBC3-4DE1-98E4-DEBDD185AEAB}"/>
+              </a:ext>
+            </a:extLst>
+          </p:cNvPr>
+          <p:cNvCxnSpPr>
+            <a:cxnSpLocks/>
+          </p:cNvCxnSpPr>
+          <p:nvPr/>
+        </p:nvCxnSpPr>
+        <p:spPr>
+          <a:xfrm flipH="1">
+            <a:off x="595421" y="467833"/>
+            <a:ext cx="21009937" cy="14949376"/>
+          </a:xfrm>
+          <a:prstGeom prst="line">
+            <a:avLst/>
+          </a:prstGeom>
+          <a:ln w="76200">
+            <a:solidFill>
+              <a:srgbClr val="FF0000"/>
+            </a:solidFill>
+          </a:ln>
+        </p:spPr>
+        <p:style>
+          <a:lnRef idx="1">
+            <a:schemeClr val="accent1"/>
+          </a:lnRef>
+          <a:fillRef idx="0">
+            <a:schemeClr val="accent1"/>
+          </a:fillRef>
+          <a:effectRef idx="0">
+            <a:schemeClr val="accent1"/>
+          </a:effectRef>
+          <a:fontRef idx="minor">
+            <a:schemeClr val="tx1"/>
+          </a:fontRef>
+        </p:style>
+      </p:cxnSp>
     </p:spTree>
     <p:extLst>
       <p:ext uri="{BB962C8B-B14F-4D97-AF65-F5344CB8AC3E}">
@@ -13793,6 +13931,2670 @@
 </file>
 
 <file path=ppt/slides/slide6.xml><?xml version="1.0" encoding="utf-8"?>
+<p:sld xmlns:a="http://schemas.openxmlformats.org/drawingml/2006/main" xmlns:r="http://schemas.openxmlformats.org/officeDocument/2006/relationships" xmlns:p="http://schemas.openxmlformats.org/presentationml/2006/main">
+  <p:cSld>
+    <p:spTree>
+      <p:nvGrpSpPr>
+        <p:cNvPr id="1" name=""/>
+        <p:cNvGrpSpPr/>
+        <p:nvPr/>
+      </p:nvGrpSpPr>
+      <p:grpSpPr>
+        <a:xfrm>
+          <a:off x="0" y="0"/>
+          <a:ext cx="0" cy="0"/>
+          <a:chOff x="0" y="0"/>
+          <a:chExt cx="0" cy="0"/>
+        </a:xfrm>
+      </p:grpSpPr>
+      <p:sp>
+        <p:nvSpPr>
+          <p:cNvPr id="123" name="Rectangle: Rounded Corners 122">
+            <a:extLst>
+              <a:ext uri="{FF2B5EF4-FFF2-40B4-BE49-F238E27FC236}">
+                <a16:creationId xmlns:a16="http://schemas.microsoft.com/office/drawing/2014/main" id="{1C7EF2D4-F2FF-49B1-A591-85BFD29AC944}"/>
+              </a:ext>
+            </a:extLst>
+          </p:cNvPr>
+          <p:cNvSpPr/>
+          <p:nvPr/>
+        </p:nvSpPr>
+        <p:spPr>
+          <a:xfrm>
+            <a:off x="15885042" y="2296633"/>
+            <a:ext cx="4918833" cy="11115615"/>
+          </a:xfrm>
+          <a:prstGeom prst="roundRect">
+            <a:avLst/>
+          </a:prstGeom>
+          <a:solidFill>
+            <a:srgbClr val="8C3FC5">
+              <a:alpha val="40000"/>
+            </a:srgbClr>
+          </a:solidFill>
+          <a:ln>
+            <a:solidFill>
+              <a:srgbClr val="8C3FC5"/>
+            </a:solidFill>
+          </a:ln>
+        </p:spPr>
+        <p:style>
+          <a:lnRef idx="2">
+            <a:schemeClr val="accent1">
+              <a:shade val="50000"/>
+            </a:schemeClr>
+          </a:lnRef>
+          <a:fillRef idx="1">
+            <a:schemeClr val="accent1"/>
+          </a:fillRef>
+          <a:effectRef idx="0">
+            <a:schemeClr val="accent1"/>
+          </a:effectRef>
+          <a:fontRef idx="minor">
+            <a:schemeClr val="lt1"/>
+          </a:fontRef>
+        </p:style>
+        <p:txBody>
+          <a:bodyPr rtlCol="0" anchor="ctr"/>
+          <a:lstStyle/>
+          <a:p>
+            <a:pPr algn="ctr"/>
+            <a:endParaRPr lang="en-US"/>
+          </a:p>
+        </p:txBody>
+      </p:sp>
+      <p:sp>
+        <p:nvSpPr>
+          <p:cNvPr id="122" name="Rectangle: Rounded Corners 121">
+            <a:extLst>
+              <a:ext uri="{FF2B5EF4-FFF2-40B4-BE49-F238E27FC236}">
+                <a16:creationId xmlns:a16="http://schemas.microsoft.com/office/drawing/2014/main" id="{1B0B8B19-6970-4FC5-B813-DA3AECF211F5}"/>
+              </a:ext>
+            </a:extLst>
+          </p:cNvPr>
+          <p:cNvSpPr/>
+          <p:nvPr/>
+        </p:nvSpPr>
+        <p:spPr>
+          <a:xfrm>
+            <a:off x="318977" y="2296633"/>
+            <a:ext cx="15289609" cy="11115615"/>
+          </a:xfrm>
+          <a:prstGeom prst="roundRect">
+            <a:avLst/>
+          </a:prstGeom>
+          <a:solidFill>
+            <a:schemeClr val="accent1">
+              <a:alpha val="40000"/>
+            </a:schemeClr>
+          </a:solidFill>
+        </p:spPr>
+        <p:style>
+          <a:lnRef idx="2">
+            <a:schemeClr val="accent1">
+              <a:shade val="50000"/>
+            </a:schemeClr>
+          </a:lnRef>
+          <a:fillRef idx="1">
+            <a:schemeClr val="accent1"/>
+          </a:fillRef>
+          <a:effectRef idx="0">
+            <a:schemeClr val="accent1"/>
+          </a:effectRef>
+          <a:fontRef idx="minor">
+            <a:schemeClr val="lt1"/>
+          </a:fontRef>
+        </p:style>
+        <p:txBody>
+          <a:bodyPr rtlCol="0" anchor="ctr"/>
+          <a:lstStyle/>
+          <a:p>
+            <a:pPr algn="ctr"/>
+            <a:endParaRPr lang="en-US"/>
+          </a:p>
+        </p:txBody>
+      </p:sp>
+      <p:cxnSp>
+        <p:nvCxnSpPr>
+          <p:cNvPr id="82" name="Connector: Elbow 81">
+            <a:extLst>
+              <a:ext uri="{FF2B5EF4-FFF2-40B4-BE49-F238E27FC236}">
+                <a16:creationId xmlns:a16="http://schemas.microsoft.com/office/drawing/2014/main" id="{0B42BB7D-2351-4546-B48C-64CD4D0B2799}"/>
+              </a:ext>
+            </a:extLst>
+          </p:cNvPr>
+          <p:cNvCxnSpPr>
+            <a:cxnSpLocks/>
+            <a:stCxn id="59" idx="1"/>
+            <a:endCxn id="10" idx="3"/>
+          </p:cNvCxnSpPr>
+          <p:nvPr/>
+        </p:nvCxnSpPr>
+        <p:spPr>
+          <a:xfrm rot="10800000" flipV="1">
+            <a:off x="8839960" y="6908118"/>
+            <a:ext cx="2246263" cy="879986"/>
+          </a:xfrm>
+          <a:prstGeom prst="bentConnector3">
+            <a:avLst/>
+          </a:prstGeom>
+          <a:ln w="38100">
+            <a:solidFill>
+              <a:srgbClr val="FF0000"/>
+            </a:solidFill>
+            <a:prstDash val="sysDot"/>
+            <a:tailEnd type="triangle"/>
+          </a:ln>
+        </p:spPr>
+        <p:style>
+          <a:lnRef idx="1">
+            <a:schemeClr val="accent1"/>
+          </a:lnRef>
+          <a:fillRef idx="0">
+            <a:schemeClr val="accent1"/>
+          </a:fillRef>
+          <a:effectRef idx="0">
+            <a:schemeClr val="accent1"/>
+          </a:effectRef>
+          <a:fontRef idx="minor">
+            <a:schemeClr val="tx1"/>
+          </a:fontRef>
+        </p:style>
+      </p:cxnSp>
+      <p:cxnSp>
+        <p:nvCxnSpPr>
+          <p:cNvPr id="4" name="Connector: Elbow 3">
+            <a:extLst>
+              <a:ext uri="{FF2B5EF4-FFF2-40B4-BE49-F238E27FC236}">
+                <a16:creationId xmlns:a16="http://schemas.microsoft.com/office/drawing/2014/main" id="{E4333C8B-4F4D-4DF1-AE5E-867645EC6977}"/>
+              </a:ext>
+            </a:extLst>
+          </p:cNvPr>
+          <p:cNvCxnSpPr>
+            <a:stCxn id="13" idx="3"/>
+            <a:endCxn id="15" idx="1"/>
+          </p:cNvCxnSpPr>
+          <p:nvPr/>
+        </p:nvCxnSpPr>
+        <p:spPr>
+          <a:xfrm>
+            <a:off x="4503652" y="8644764"/>
+            <a:ext cx="2246248" cy="850099"/>
+          </a:xfrm>
+          <a:prstGeom prst="bentConnector3">
+            <a:avLst/>
+          </a:prstGeom>
+          <a:ln w="38100">
+            <a:solidFill>
+              <a:srgbClr val="FF0000"/>
+            </a:solidFill>
+            <a:prstDash val="sysDot"/>
+            <a:tailEnd type="triangle"/>
+          </a:ln>
+        </p:spPr>
+        <p:style>
+          <a:lnRef idx="1">
+            <a:schemeClr val="accent1"/>
+          </a:lnRef>
+          <a:fillRef idx="0">
+            <a:schemeClr val="accent1"/>
+          </a:fillRef>
+          <a:effectRef idx="0">
+            <a:schemeClr val="accent1"/>
+          </a:effectRef>
+          <a:fontRef idx="minor">
+            <a:schemeClr val="tx1"/>
+          </a:fontRef>
+        </p:style>
+      </p:cxnSp>
+      <p:sp>
+        <p:nvSpPr>
+          <p:cNvPr id="5" name="Flowchart: Off-page Connector 4">
+            <a:extLst>
+              <a:ext uri="{FF2B5EF4-FFF2-40B4-BE49-F238E27FC236}">
+                <a16:creationId xmlns:a16="http://schemas.microsoft.com/office/drawing/2014/main" id="{DACAEBCB-4FBC-496C-BAB8-D5ACE92A8E8C}"/>
+              </a:ext>
+            </a:extLst>
+          </p:cNvPr>
+          <p:cNvSpPr/>
+          <p:nvPr/>
+        </p:nvSpPr>
+        <p:spPr>
+          <a:xfrm>
+            <a:off x="6749908" y="2775062"/>
+            <a:ext cx="2090057" cy="1063298"/>
+          </a:xfrm>
+          <a:prstGeom prst="flowChartOffpageConnector">
+            <a:avLst/>
+          </a:prstGeom>
+        </p:spPr>
+        <p:style>
+          <a:lnRef idx="2">
+            <a:schemeClr val="accent1">
+              <a:shade val="50000"/>
+            </a:schemeClr>
+          </a:lnRef>
+          <a:fillRef idx="1">
+            <a:schemeClr val="accent1"/>
+          </a:fillRef>
+          <a:effectRef idx="0">
+            <a:schemeClr val="accent1"/>
+          </a:effectRef>
+          <a:fontRef idx="minor">
+            <a:schemeClr val="lt1"/>
+          </a:fontRef>
+        </p:style>
+        <p:txBody>
+          <a:bodyPr rtlCol="0" anchor="ctr"/>
+          <a:lstStyle/>
+          <a:p>
+            <a:pPr algn="ctr"/>
+            <a:r>
+              <a:rPr lang="en-US" dirty="0"/>
+              <a:t>Initialize </a:t>
+            </a:r>
+            <a:r>
+              <a:rPr lang="en-US" dirty="0" err="1"/>
+              <a:t>voleTags</a:t>
+            </a:r>
+            <a:r>
+              <a:rPr lang="en-US" dirty="0"/>
+              <a:t> Queue</a:t>
+            </a:r>
+          </a:p>
+        </p:txBody>
+      </p:sp>
+      <p:sp>
+        <p:nvSpPr>
+          <p:cNvPr id="9" name="Flowchart: Off-page Connector 8">
+            <a:extLst>
+              <a:ext uri="{FF2B5EF4-FFF2-40B4-BE49-F238E27FC236}">
+                <a16:creationId xmlns:a16="http://schemas.microsoft.com/office/drawing/2014/main" id="{59299086-D702-431F-B750-5697B87233F4}"/>
+              </a:ext>
+            </a:extLst>
+          </p:cNvPr>
+          <p:cNvSpPr/>
+          <p:nvPr/>
+        </p:nvSpPr>
+        <p:spPr>
+          <a:xfrm>
+            <a:off x="6749907" y="6587608"/>
+            <a:ext cx="2090057" cy="641017"/>
+          </a:xfrm>
+          <a:prstGeom prst="flowChartOffpageConnector">
+            <a:avLst/>
+          </a:prstGeom>
+        </p:spPr>
+        <p:style>
+          <a:lnRef idx="2">
+            <a:schemeClr val="accent1">
+              <a:shade val="50000"/>
+            </a:schemeClr>
+          </a:lnRef>
+          <a:fillRef idx="1">
+            <a:schemeClr val="accent1"/>
+          </a:fillRef>
+          <a:effectRef idx="0">
+            <a:schemeClr val="accent1"/>
+          </a:effectRef>
+          <a:fontRef idx="minor">
+            <a:schemeClr val="lt1"/>
+          </a:fontRef>
+        </p:style>
+        <p:txBody>
+          <a:bodyPr rtlCol="0" anchor="ctr"/>
+          <a:lstStyle/>
+          <a:p>
+            <a:pPr algn="ctr"/>
+            <a:r>
+              <a:rPr lang="en-US" dirty="0"/>
+              <a:t>Output vole number and </a:t>
+            </a:r>
+            <a:r>
+              <a:rPr lang="en-US" dirty="0" err="1"/>
+              <a:t>rfid</a:t>
+            </a:r>
+            <a:r>
+              <a:rPr lang="en-US" dirty="0"/>
+              <a:t> tag</a:t>
+            </a:r>
+          </a:p>
+        </p:txBody>
+      </p:sp>
+      <p:sp>
+        <p:nvSpPr>
+          <p:cNvPr id="10" name="Flowchart: Off-page Connector 9">
+            <a:extLst>
+              <a:ext uri="{FF2B5EF4-FFF2-40B4-BE49-F238E27FC236}">
+                <a16:creationId xmlns:a16="http://schemas.microsoft.com/office/drawing/2014/main" id="{1520CC44-909B-4099-9128-22001240A026}"/>
+              </a:ext>
+            </a:extLst>
+          </p:cNvPr>
+          <p:cNvSpPr/>
+          <p:nvPr/>
+        </p:nvSpPr>
+        <p:spPr>
+          <a:xfrm>
+            <a:off x="6749902" y="7467595"/>
+            <a:ext cx="2090057" cy="641017"/>
+          </a:xfrm>
+          <a:prstGeom prst="flowChartOffpageConnector">
+            <a:avLst/>
+          </a:prstGeom>
+        </p:spPr>
+        <p:style>
+          <a:lnRef idx="2">
+            <a:schemeClr val="accent1">
+              <a:shade val="50000"/>
+            </a:schemeClr>
+          </a:lnRef>
+          <a:fillRef idx="1">
+            <a:schemeClr val="accent1"/>
+          </a:fillRef>
+          <a:effectRef idx="0">
+            <a:schemeClr val="accent1"/>
+          </a:effectRef>
+          <a:fontRef idx="minor">
+            <a:schemeClr val="lt1"/>
+          </a:fontRef>
+        </p:style>
+        <p:txBody>
+          <a:bodyPr rtlCol="0" anchor="ctr"/>
+          <a:lstStyle/>
+          <a:p>
+            <a:pPr algn="ctr"/>
+            <a:r>
+              <a:rPr lang="en-US" dirty="0"/>
+              <a:t>Output “none”</a:t>
+            </a:r>
+          </a:p>
+        </p:txBody>
+      </p:sp>
+      <p:cxnSp>
+        <p:nvCxnSpPr>
+          <p:cNvPr id="11" name="Connector: Elbow 10">
+            <a:extLst>
+              <a:ext uri="{FF2B5EF4-FFF2-40B4-BE49-F238E27FC236}">
+                <a16:creationId xmlns:a16="http://schemas.microsoft.com/office/drawing/2014/main" id="{2114D124-8147-4269-9BCB-9F5473E50165}"/>
+              </a:ext>
+            </a:extLst>
+          </p:cNvPr>
+          <p:cNvCxnSpPr>
+            <a:stCxn id="8" idx="3"/>
+            <a:endCxn id="10" idx="1"/>
+          </p:cNvCxnSpPr>
+          <p:nvPr/>
+        </p:nvCxnSpPr>
+        <p:spPr>
+          <a:xfrm>
+            <a:off x="4503651" y="6908118"/>
+            <a:ext cx="2246251" cy="879986"/>
+          </a:xfrm>
+          <a:prstGeom prst="bentConnector3">
+            <a:avLst/>
+          </a:prstGeom>
+          <a:ln w="38100">
+            <a:solidFill>
+              <a:srgbClr val="FF0000"/>
+            </a:solidFill>
+            <a:prstDash val="sysDot"/>
+            <a:tailEnd type="triangle"/>
+          </a:ln>
+        </p:spPr>
+        <p:style>
+          <a:lnRef idx="1">
+            <a:schemeClr val="accent1"/>
+          </a:lnRef>
+          <a:fillRef idx="0">
+            <a:schemeClr val="accent1"/>
+          </a:fillRef>
+          <a:effectRef idx="0">
+            <a:schemeClr val="accent1"/>
+          </a:effectRef>
+          <a:fontRef idx="minor">
+            <a:schemeClr val="tx1"/>
+          </a:fontRef>
+        </p:style>
+      </p:cxnSp>
+      <p:cxnSp>
+        <p:nvCxnSpPr>
+          <p:cNvPr id="12" name="Connector: Elbow 11">
+            <a:extLst>
+              <a:ext uri="{FF2B5EF4-FFF2-40B4-BE49-F238E27FC236}">
+                <a16:creationId xmlns:a16="http://schemas.microsoft.com/office/drawing/2014/main" id="{F28EB982-EA27-4A6D-A6E8-A32ED247A293}"/>
+              </a:ext>
+            </a:extLst>
+          </p:cNvPr>
+          <p:cNvCxnSpPr>
+            <a:stCxn id="8" idx="3"/>
+            <a:endCxn id="9" idx="1"/>
+          </p:cNvCxnSpPr>
+          <p:nvPr/>
+        </p:nvCxnSpPr>
+        <p:spPr>
+          <a:xfrm flipV="1">
+            <a:off x="4503651" y="6908117"/>
+            <a:ext cx="2246256" cy="1"/>
+          </a:xfrm>
+          <a:prstGeom prst="bentConnector3">
+            <a:avLst/>
+          </a:prstGeom>
+          <a:ln w="38100">
+            <a:solidFill>
+              <a:srgbClr val="00B050"/>
+            </a:solidFill>
+            <a:prstDash val="sysDot"/>
+            <a:tailEnd type="triangle"/>
+          </a:ln>
+        </p:spPr>
+        <p:style>
+          <a:lnRef idx="1">
+            <a:schemeClr val="accent1"/>
+          </a:lnRef>
+          <a:fillRef idx="0">
+            <a:schemeClr val="accent1"/>
+          </a:fillRef>
+          <a:effectRef idx="0">
+            <a:schemeClr val="accent1"/>
+          </a:effectRef>
+          <a:fontRef idx="minor">
+            <a:schemeClr val="tx1"/>
+          </a:fontRef>
+        </p:style>
+      </p:cxnSp>
+      <p:sp>
+        <p:nvSpPr>
+          <p:cNvPr id="14" name="Flowchart: Off-page Connector 13">
+            <a:extLst>
+              <a:ext uri="{FF2B5EF4-FFF2-40B4-BE49-F238E27FC236}">
+                <a16:creationId xmlns:a16="http://schemas.microsoft.com/office/drawing/2014/main" id="{12C4F979-FD86-4BC3-B362-B6EDFBF3F19A}"/>
+              </a:ext>
+            </a:extLst>
+          </p:cNvPr>
+          <p:cNvSpPr/>
+          <p:nvPr/>
+        </p:nvSpPr>
+        <p:spPr>
+          <a:xfrm>
+            <a:off x="6749901" y="8317694"/>
+            <a:ext cx="2090057" cy="641017"/>
+          </a:xfrm>
+          <a:prstGeom prst="flowChartOffpageConnector">
+            <a:avLst/>
+          </a:prstGeom>
+        </p:spPr>
+        <p:style>
+          <a:lnRef idx="2">
+            <a:schemeClr val="accent1">
+              <a:shade val="50000"/>
+            </a:schemeClr>
+          </a:lnRef>
+          <a:fillRef idx="1">
+            <a:schemeClr val="accent1"/>
+          </a:fillRef>
+          <a:effectRef idx="0">
+            <a:schemeClr val="accent1"/>
+          </a:effectRef>
+          <a:fontRef idx="minor">
+            <a:schemeClr val="lt1"/>
+          </a:fontRef>
+        </p:style>
+        <p:txBody>
+          <a:bodyPr rtlCol="0" anchor="ctr"/>
+          <a:lstStyle/>
+          <a:p>
+            <a:pPr algn="ctr"/>
+            <a:r>
+              <a:rPr lang="en-US" dirty="0"/>
+              <a:t>Output vole number and </a:t>
+            </a:r>
+            <a:r>
+              <a:rPr lang="en-US" dirty="0" err="1"/>
+              <a:t>rfid</a:t>
+            </a:r>
+            <a:r>
+              <a:rPr lang="en-US" dirty="0"/>
+              <a:t> tag</a:t>
+            </a:r>
+          </a:p>
+        </p:txBody>
+      </p:sp>
+      <p:sp>
+        <p:nvSpPr>
+          <p:cNvPr id="15" name="Flowchart: Off-page Connector 14">
+            <a:extLst>
+              <a:ext uri="{FF2B5EF4-FFF2-40B4-BE49-F238E27FC236}">
+                <a16:creationId xmlns:a16="http://schemas.microsoft.com/office/drawing/2014/main" id="{C80C0554-5CDC-47B0-BBCC-4DD2FF048724}"/>
+              </a:ext>
+            </a:extLst>
+          </p:cNvPr>
+          <p:cNvSpPr/>
+          <p:nvPr/>
+        </p:nvSpPr>
+        <p:spPr>
+          <a:xfrm>
+            <a:off x="6749900" y="9174354"/>
+            <a:ext cx="2090057" cy="641017"/>
+          </a:xfrm>
+          <a:prstGeom prst="flowChartOffpageConnector">
+            <a:avLst/>
+          </a:prstGeom>
+        </p:spPr>
+        <p:style>
+          <a:lnRef idx="2">
+            <a:schemeClr val="accent1">
+              <a:shade val="50000"/>
+            </a:schemeClr>
+          </a:lnRef>
+          <a:fillRef idx="1">
+            <a:schemeClr val="accent1"/>
+          </a:fillRef>
+          <a:effectRef idx="0">
+            <a:schemeClr val="accent1"/>
+          </a:effectRef>
+          <a:fontRef idx="minor">
+            <a:schemeClr val="lt1"/>
+          </a:fontRef>
+        </p:style>
+        <p:txBody>
+          <a:bodyPr rtlCol="0" anchor="ctr"/>
+          <a:lstStyle/>
+          <a:p>
+            <a:pPr algn="ctr"/>
+            <a:r>
+              <a:rPr lang="en-US" dirty="0"/>
+              <a:t>Output “none”</a:t>
+            </a:r>
+          </a:p>
+        </p:txBody>
+      </p:sp>
+      <p:cxnSp>
+        <p:nvCxnSpPr>
+          <p:cNvPr id="16" name="Connector: Elbow 15">
+            <a:extLst>
+              <a:ext uri="{FF2B5EF4-FFF2-40B4-BE49-F238E27FC236}">
+                <a16:creationId xmlns:a16="http://schemas.microsoft.com/office/drawing/2014/main" id="{B9B20591-7037-48DF-9A11-9FF8C12FD53C}"/>
+              </a:ext>
+            </a:extLst>
+          </p:cNvPr>
+          <p:cNvCxnSpPr>
+            <a:stCxn id="13" idx="3"/>
+            <a:endCxn id="14" idx="1"/>
+          </p:cNvCxnSpPr>
+          <p:nvPr/>
+        </p:nvCxnSpPr>
+        <p:spPr>
+          <a:xfrm flipV="1">
+            <a:off x="4503652" y="8638203"/>
+            <a:ext cx="2246249" cy="6561"/>
+          </a:xfrm>
+          <a:prstGeom prst="bentConnector3">
+            <a:avLst/>
+          </a:prstGeom>
+          <a:ln w="38100">
+            <a:solidFill>
+              <a:srgbClr val="00B050"/>
+            </a:solidFill>
+            <a:prstDash val="sysDot"/>
+            <a:tailEnd type="triangle"/>
+          </a:ln>
+        </p:spPr>
+        <p:style>
+          <a:lnRef idx="1">
+            <a:schemeClr val="accent1"/>
+          </a:lnRef>
+          <a:fillRef idx="0">
+            <a:schemeClr val="accent1"/>
+          </a:fillRef>
+          <a:effectRef idx="0">
+            <a:schemeClr val="accent1"/>
+          </a:effectRef>
+          <a:fontRef idx="minor">
+            <a:schemeClr val="tx1"/>
+          </a:fontRef>
+        </p:style>
+      </p:cxnSp>
+      <p:cxnSp>
+        <p:nvCxnSpPr>
+          <p:cNvPr id="20" name="Connector: Elbow 19">
+            <a:extLst>
+              <a:ext uri="{FF2B5EF4-FFF2-40B4-BE49-F238E27FC236}">
+                <a16:creationId xmlns:a16="http://schemas.microsoft.com/office/drawing/2014/main" id="{E88A7956-1ABC-4904-B8E4-5261AB8C0627}"/>
+              </a:ext>
+            </a:extLst>
+          </p:cNvPr>
+          <p:cNvCxnSpPr>
+            <a:stCxn id="5" idx="2"/>
+            <a:endCxn id="9" idx="0"/>
+          </p:cNvCxnSpPr>
+          <p:nvPr/>
+        </p:nvCxnSpPr>
+        <p:spPr>
+          <a:xfrm rot="5400000">
+            <a:off x="6420313" y="5212984"/>
+            <a:ext cx="2749248" cy="1"/>
+          </a:xfrm>
+          <a:prstGeom prst="bentConnector3">
+            <a:avLst/>
+          </a:prstGeom>
+          <a:ln w="38100">
+            <a:prstDash val="sysDot"/>
+            <a:tailEnd type="triangle"/>
+          </a:ln>
+        </p:spPr>
+        <p:style>
+          <a:lnRef idx="1">
+            <a:schemeClr val="accent1"/>
+          </a:lnRef>
+          <a:fillRef idx="0">
+            <a:schemeClr val="accent1"/>
+          </a:fillRef>
+          <a:effectRef idx="0">
+            <a:schemeClr val="accent1"/>
+          </a:effectRef>
+          <a:fontRef idx="minor">
+            <a:schemeClr val="tx1"/>
+          </a:fontRef>
+        </p:style>
+      </p:cxnSp>
+      <p:sp>
+        <p:nvSpPr>
+          <p:cNvPr id="6" name="Flowchart: Process 5">
+            <a:extLst>
+              <a:ext uri="{FF2B5EF4-FFF2-40B4-BE49-F238E27FC236}">
+                <a16:creationId xmlns:a16="http://schemas.microsoft.com/office/drawing/2014/main" id="{0886BD82-75C0-4A57-9682-54659204393F}"/>
+              </a:ext>
+            </a:extLst>
+          </p:cNvPr>
+          <p:cNvSpPr/>
+          <p:nvPr/>
+        </p:nvSpPr>
+        <p:spPr>
+          <a:xfrm>
+            <a:off x="2413594" y="3046952"/>
+            <a:ext cx="2090057" cy="519519"/>
+          </a:xfrm>
+          <a:prstGeom prst="flowChartProcess">
+            <a:avLst/>
+          </a:prstGeom>
+        </p:spPr>
+        <p:style>
+          <a:lnRef idx="2">
+            <a:schemeClr val="accent1">
+              <a:shade val="50000"/>
+            </a:schemeClr>
+          </a:lnRef>
+          <a:fillRef idx="1">
+            <a:schemeClr val="accent1"/>
+          </a:fillRef>
+          <a:effectRef idx="0">
+            <a:schemeClr val="accent1"/>
+          </a:effectRef>
+          <a:fontRef idx="minor">
+            <a:schemeClr val="lt1"/>
+          </a:fontRef>
+        </p:style>
+        <p:txBody>
+          <a:bodyPr rtlCol="0" anchor="ctr"/>
+          <a:lstStyle/>
+          <a:p>
+            <a:pPr algn="ctr"/>
+            <a:r>
+              <a:rPr lang="en-US" dirty="0"/>
+              <a:t>Start Thread 1</a:t>
+            </a:r>
+          </a:p>
+        </p:txBody>
+      </p:sp>
+      <p:sp>
+        <p:nvSpPr>
+          <p:cNvPr id="7" name="Flowchart: Process 6">
+            <a:extLst>
+              <a:ext uri="{FF2B5EF4-FFF2-40B4-BE49-F238E27FC236}">
+                <a16:creationId xmlns:a16="http://schemas.microsoft.com/office/drawing/2014/main" id="{50E0C74D-550C-42E4-BD73-1625F9AFC1E6}"/>
+              </a:ext>
+            </a:extLst>
+          </p:cNvPr>
+          <p:cNvSpPr/>
+          <p:nvPr/>
+        </p:nvSpPr>
+        <p:spPr>
+          <a:xfrm>
+            <a:off x="2413595" y="5229151"/>
+            <a:ext cx="2090057" cy="519519"/>
+          </a:xfrm>
+          <a:prstGeom prst="flowChartProcess">
+            <a:avLst/>
+          </a:prstGeom>
+        </p:spPr>
+        <p:style>
+          <a:lnRef idx="2">
+            <a:schemeClr val="accent1">
+              <a:shade val="50000"/>
+            </a:schemeClr>
+          </a:lnRef>
+          <a:fillRef idx="1">
+            <a:schemeClr val="accent1"/>
+          </a:fillRef>
+          <a:effectRef idx="0">
+            <a:schemeClr val="accent1"/>
+          </a:effectRef>
+          <a:fontRef idx="minor">
+            <a:schemeClr val="lt1"/>
+          </a:fontRef>
+        </p:style>
+        <p:txBody>
+          <a:bodyPr rtlCol="0" anchor="ctr"/>
+          <a:lstStyle/>
+          <a:p>
+            <a:pPr algn="ctr"/>
+            <a:r>
+              <a:rPr lang="en-US" dirty="0"/>
+              <a:t>Read sensor signal</a:t>
+            </a:r>
+          </a:p>
+        </p:txBody>
+      </p:sp>
+      <p:sp>
+        <p:nvSpPr>
+          <p:cNvPr id="8" name="Flowchart: Decision 7">
+            <a:extLst>
+              <a:ext uri="{FF2B5EF4-FFF2-40B4-BE49-F238E27FC236}">
+                <a16:creationId xmlns:a16="http://schemas.microsoft.com/office/drawing/2014/main" id="{463B6A9A-69E1-403E-9058-ACAEDA151340}"/>
+              </a:ext>
+            </a:extLst>
+          </p:cNvPr>
+          <p:cNvSpPr/>
+          <p:nvPr/>
+        </p:nvSpPr>
+        <p:spPr>
+          <a:xfrm>
+            <a:off x="2413594" y="6330919"/>
+            <a:ext cx="2090057" cy="1154397"/>
+          </a:xfrm>
+          <a:prstGeom prst="flowChartDecision">
+            <a:avLst/>
+          </a:prstGeom>
+        </p:spPr>
+        <p:style>
+          <a:lnRef idx="2">
+            <a:schemeClr val="accent1">
+              <a:shade val="50000"/>
+            </a:schemeClr>
+          </a:lnRef>
+          <a:fillRef idx="1">
+            <a:schemeClr val="accent1"/>
+          </a:fillRef>
+          <a:effectRef idx="0">
+            <a:schemeClr val="accent1"/>
+          </a:effectRef>
+          <a:fontRef idx="minor">
+            <a:schemeClr val="lt1"/>
+          </a:fontRef>
+        </p:style>
+        <p:txBody>
+          <a:bodyPr rtlCol="0" anchor="ctr"/>
+          <a:lstStyle/>
+          <a:p>
+            <a:pPr algn="ctr"/>
+            <a:r>
+              <a:rPr lang="en-US" dirty="0"/>
+              <a:t>Did it ping vole 1?</a:t>
+            </a:r>
+          </a:p>
+        </p:txBody>
+      </p:sp>
+      <p:sp>
+        <p:nvSpPr>
+          <p:cNvPr id="13" name="Flowchart: Decision 12">
+            <a:extLst>
+              <a:ext uri="{FF2B5EF4-FFF2-40B4-BE49-F238E27FC236}">
+                <a16:creationId xmlns:a16="http://schemas.microsoft.com/office/drawing/2014/main" id="{C86490A3-4648-4077-B80C-B9DC16FA7FD2}"/>
+              </a:ext>
+            </a:extLst>
+          </p:cNvPr>
+          <p:cNvSpPr/>
+          <p:nvPr/>
+        </p:nvSpPr>
+        <p:spPr>
+          <a:xfrm>
+            <a:off x="2413595" y="8067565"/>
+            <a:ext cx="2090057" cy="1154397"/>
+          </a:xfrm>
+          <a:prstGeom prst="flowChartDecision">
+            <a:avLst/>
+          </a:prstGeom>
+        </p:spPr>
+        <p:style>
+          <a:lnRef idx="2">
+            <a:schemeClr val="accent1">
+              <a:shade val="50000"/>
+            </a:schemeClr>
+          </a:lnRef>
+          <a:fillRef idx="1">
+            <a:schemeClr val="accent1"/>
+          </a:fillRef>
+          <a:effectRef idx="0">
+            <a:schemeClr val="accent1"/>
+          </a:effectRef>
+          <a:fontRef idx="minor">
+            <a:schemeClr val="lt1"/>
+          </a:fontRef>
+        </p:style>
+        <p:txBody>
+          <a:bodyPr rtlCol="0" anchor="ctr"/>
+          <a:lstStyle/>
+          <a:p>
+            <a:pPr algn="ctr"/>
+            <a:r>
+              <a:rPr lang="en-US" dirty="0"/>
+              <a:t>Did it ping vole 2?</a:t>
+            </a:r>
+          </a:p>
+        </p:txBody>
+      </p:sp>
+      <p:cxnSp>
+        <p:nvCxnSpPr>
+          <p:cNvPr id="18" name="Connector: Elbow 17">
+            <a:extLst>
+              <a:ext uri="{FF2B5EF4-FFF2-40B4-BE49-F238E27FC236}">
+                <a16:creationId xmlns:a16="http://schemas.microsoft.com/office/drawing/2014/main" id="{0816CFB8-ABDF-4F15-A835-D9B79153189B}"/>
+              </a:ext>
+            </a:extLst>
+          </p:cNvPr>
+          <p:cNvCxnSpPr>
+            <a:stCxn id="7" idx="2"/>
+            <a:endCxn id="8" idx="0"/>
+          </p:cNvCxnSpPr>
+          <p:nvPr/>
+        </p:nvCxnSpPr>
+        <p:spPr>
+          <a:xfrm rot="5400000">
+            <a:off x="3167500" y="6039794"/>
+            <a:ext cx="582249" cy="1"/>
+          </a:xfrm>
+          <a:prstGeom prst="bentConnector3">
+            <a:avLst/>
+          </a:prstGeom>
+          <a:ln w="38100">
+            <a:tailEnd type="triangle"/>
+          </a:ln>
+        </p:spPr>
+        <p:style>
+          <a:lnRef idx="1">
+            <a:schemeClr val="accent1"/>
+          </a:lnRef>
+          <a:fillRef idx="0">
+            <a:schemeClr val="accent1"/>
+          </a:fillRef>
+          <a:effectRef idx="0">
+            <a:schemeClr val="accent1"/>
+          </a:effectRef>
+          <a:fontRef idx="minor">
+            <a:schemeClr val="tx1"/>
+          </a:fontRef>
+        </p:style>
+      </p:cxnSp>
+      <p:cxnSp>
+        <p:nvCxnSpPr>
+          <p:cNvPr id="19" name="Connector: Elbow 18">
+            <a:extLst>
+              <a:ext uri="{FF2B5EF4-FFF2-40B4-BE49-F238E27FC236}">
+                <a16:creationId xmlns:a16="http://schemas.microsoft.com/office/drawing/2014/main" id="{91992AFC-8BEF-4E3F-9E4C-964814A5FF0E}"/>
+              </a:ext>
+            </a:extLst>
+          </p:cNvPr>
+          <p:cNvCxnSpPr>
+            <a:stCxn id="8" idx="2"/>
+            <a:endCxn id="13" idx="0"/>
+          </p:cNvCxnSpPr>
+          <p:nvPr/>
+        </p:nvCxnSpPr>
+        <p:spPr>
+          <a:xfrm rot="16200000" flipH="1">
+            <a:off x="3167499" y="7776439"/>
+            <a:ext cx="582249" cy="1"/>
+          </a:xfrm>
+          <a:prstGeom prst="bentConnector3">
+            <a:avLst/>
+          </a:prstGeom>
+          <a:ln w="38100">
+            <a:tailEnd type="triangle"/>
+          </a:ln>
+        </p:spPr>
+        <p:style>
+          <a:lnRef idx="1">
+            <a:schemeClr val="accent1"/>
+          </a:lnRef>
+          <a:fillRef idx="0">
+            <a:schemeClr val="accent1"/>
+          </a:fillRef>
+          <a:effectRef idx="0">
+            <a:schemeClr val="accent1"/>
+          </a:effectRef>
+          <a:fontRef idx="minor">
+            <a:schemeClr val="tx1"/>
+          </a:fontRef>
+        </p:style>
+      </p:cxnSp>
+      <p:sp>
+        <p:nvSpPr>
+          <p:cNvPr id="31" name="Flowchart: Process 30">
+            <a:extLst>
+              <a:ext uri="{FF2B5EF4-FFF2-40B4-BE49-F238E27FC236}">
+                <a16:creationId xmlns:a16="http://schemas.microsoft.com/office/drawing/2014/main" id="{5666486C-FB5A-4D7D-B58C-0D5E9345B993}"/>
+              </a:ext>
+            </a:extLst>
+          </p:cNvPr>
+          <p:cNvSpPr/>
+          <p:nvPr/>
+        </p:nvSpPr>
+        <p:spPr>
+          <a:xfrm>
+            <a:off x="2413593" y="4145884"/>
+            <a:ext cx="2090057" cy="519519"/>
+          </a:xfrm>
+          <a:prstGeom prst="flowChartProcess">
+            <a:avLst/>
+          </a:prstGeom>
+        </p:spPr>
+        <p:style>
+          <a:lnRef idx="2">
+            <a:schemeClr val="accent1">
+              <a:shade val="50000"/>
+            </a:schemeClr>
+          </a:lnRef>
+          <a:fillRef idx="1">
+            <a:schemeClr val="accent1"/>
+          </a:fillRef>
+          <a:effectRef idx="0">
+            <a:schemeClr val="accent1"/>
+          </a:effectRef>
+          <a:fontRef idx="minor">
+            <a:schemeClr val="lt1"/>
+          </a:fontRef>
+        </p:style>
+        <p:txBody>
+          <a:bodyPr rtlCol="0" anchor="ctr"/>
+          <a:lstStyle/>
+          <a:p>
+            <a:pPr algn="ctr"/>
+            <a:r>
+              <a:rPr lang="en-US" dirty="0"/>
+              <a:t>Set event to FALSE</a:t>
+            </a:r>
+          </a:p>
+        </p:txBody>
+      </p:sp>
+      <p:cxnSp>
+        <p:nvCxnSpPr>
+          <p:cNvPr id="37" name="Straight Arrow Connector 36">
+            <a:extLst>
+              <a:ext uri="{FF2B5EF4-FFF2-40B4-BE49-F238E27FC236}">
+                <a16:creationId xmlns:a16="http://schemas.microsoft.com/office/drawing/2014/main" id="{9D3F9935-3676-424A-A825-5E3D3DAECAFB}"/>
+              </a:ext>
+            </a:extLst>
+          </p:cNvPr>
+          <p:cNvCxnSpPr>
+            <a:stCxn id="6" idx="2"/>
+            <a:endCxn id="31" idx="0"/>
+          </p:cNvCxnSpPr>
+          <p:nvPr/>
+        </p:nvCxnSpPr>
+        <p:spPr>
+          <a:xfrm flipH="1">
+            <a:off x="3458622" y="3566471"/>
+            <a:ext cx="1" cy="579413"/>
+          </a:xfrm>
+          <a:prstGeom prst="straightConnector1">
+            <a:avLst/>
+          </a:prstGeom>
+          <a:ln w="38100">
+            <a:tailEnd type="triangle"/>
+          </a:ln>
+        </p:spPr>
+        <p:style>
+          <a:lnRef idx="1">
+            <a:schemeClr val="accent1"/>
+          </a:lnRef>
+          <a:fillRef idx="0">
+            <a:schemeClr val="accent1"/>
+          </a:fillRef>
+          <a:effectRef idx="0">
+            <a:schemeClr val="accent1"/>
+          </a:effectRef>
+          <a:fontRef idx="minor">
+            <a:schemeClr val="tx1"/>
+          </a:fontRef>
+        </p:style>
+      </p:cxnSp>
+      <p:cxnSp>
+        <p:nvCxnSpPr>
+          <p:cNvPr id="39" name="Connector: Elbow 38">
+            <a:extLst>
+              <a:ext uri="{FF2B5EF4-FFF2-40B4-BE49-F238E27FC236}">
+                <a16:creationId xmlns:a16="http://schemas.microsoft.com/office/drawing/2014/main" id="{A3A2F40E-DA34-4A46-AE66-B68F5FB0BA37}"/>
+              </a:ext>
+            </a:extLst>
+          </p:cNvPr>
+          <p:cNvCxnSpPr>
+            <a:stCxn id="31" idx="2"/>
+            <a:endCxn id="7" idx="0"/>
+          </p:cNvCxnSpPr>
+          <p:nvPr/>
+        </p:nvCxnSpPr>
+        <p:spPr>
+          <a:xfrm rot="16200000" flipH="1">
+            <a:off x="3176749" y="4947276"/>
+            <a:ext cx="563748" cy="2"/>
+          </a:xfrm>
+          <a:prstGeom prst="bentConnector3">
+            <a:avLst/>
+          </a:prstGeom>
+          <a:ln w="38100">
+            <a:tailEnd type="triangle"/>
+          </a:ln>
+        </p:spPr>
+        <p:style>
+          <a:lnRef idx="1">
+            <a:schemeClr val="accent1"/>
+          </a:lnRef>
+          <a:fillRef idx="0">
+            <a:schemeClr val="accent1"/>
+          </a:fillRef>
+          <a:effectRef idx="0">
+            <a:schemeClr val="accent1"/>
+          </a:effectRef>
+          <a:fontRef idx="minor">
+            <a:schemeClr val="tx1"/>
+          </a:fontRef>
+        </p:style>
+      </p:cxnSp>
+      <p:sp>
+        <p:nvSpPr>
+          <p:cNvPr id="41" name="Flowchart: Process 40">
+            <a:extLst>
+              <a:ext uri="{FF2B5EF4-FFF2-40B4-BE49-F238E27FC236}">
+                <a16:creationId xmlns:a16="http://schemas.microsoft.com/office/drawing/2014/main" id="{247B4AA5-3C82-4F68-8953-C202A5BED085}"/>
+              </a:ext>
+            </a:extLst>
+          </p:cNvPr>
+          <p:cNvSpPr/>
+          <p:nvPr/>
+        </p:nvSpPr>
+        <p:spPr>
+          <a:xfrm>
+            <a:off x="2413593" y="10492462"/>
+            <a:ext cx="2090057" cy="519519"/>
+          </a:xfrm>
+          <a:prstGeom prst="flowChartProcess">
+            <a:avLst/>
+          </a:prstGeom>
+        </p:spPr>
+        <p:style>
+          <a:lnRef idx="2">
+            <a:schemeClr val="accent1">
+              <a:shade val="50000"/>
+            </a:schemeClr>
+          </a:lnRef>
+          <a:fillRef idx="1">
+            <a:schemeClr val="accent1"/>
+          </a:fillRef>
+          <a:effectRef idx="0">
+            <a:schemeClr val="accent1"/>
+          </a:effectRef>
+          <a:fontRef idx="minor">
+            <a:schemeClr val="lt1"/>
+          </a:fontRef>
+        </p:style>
+        <p:txBody>
+          <a:bodyPr rtlCol="0" anchor="ctr"/>
+          <a:lstStyle/>
+          <a:p>
+            <a:pPr algn="ctr"/>
+            <a:r>
+              <a:rPr lang="en-US" dirty="0"/>
+              <a:t>Set event to TRUE</a:t>
+            </a:r>
+          </a:p>
+        </p:txBody>
+      </p:sp>
+      <p:sp>
+        <p:nvSpPr>
+          <p:cNvPr id="42" name="Flowchart: Process 41">
+            <a:extLst>
+              <a:ext uri="{FF2B5EF4-FFF2-40B4-BE49-F238E27FC236}">
+                <a16:creationId xmlns:a16="http://schemas.microsoft.com/office/drawing/2014/main" id="{2ABD2069-1BA1-4C35-A3D5-67CAFF4A3046}"/>
+              </a:ext>
+            </a:extLst>
+          </p:cNvPr>
+          <p:cNvSpPr/>
+          <p:nvPr/>
+        </p:nvSpPr>
+        <p:spPr>
+          <a:xfrm>
+            <a:off x="2413592" y="11575729"/>
+            <a:ext cx="2090057" cy="519519"/>
+          </a:xfrm>
+          <a:prstGeom prst="flowChartProcess">
+            <a:avLst/>
+          </a:prstGeom>
+        </p:spPr>
+        <p:style>
+          <a:lnRef idx="2">
+            <a:schemeClr val="accent1">
+              <a:shade val="50000"/>
+            </a:schemeClr>
+          </a:lnRef>
+          <a:fillRef idx="1">
+            <a:schemeClr val="accent1"/>
+          </a:fillRef>
+          <a:effectRef idx="0">
+            <a:schemeClr val="accent1"/>
+          </a:effectRef>
+          <a:fontRef idx="minor">
+            <a:schemeClr val="lt1"/>
+          </a:fontRef>
+        </p:style>
+        <p:txBody>
+          <a:bodyPr rtlCol="0" anchor="ctr"/>
+          <a:lstStyle/>
+          <a:p>
+            <a:pPr algn="ctr"/>
+            <a:r>
+              <a:rPr lang="en-US" dirty="0"/>
+              <a:t>WAIT for Main Event</a:t>
+            </a:r>
+          </a:p>
+        </p:txBody>
+      </p:sp>
+      <p:cxnSp>
+        <p:nvCxnSpPr>
+          <p:cNvPr id="44" name="Connector: Elbow 43">
+            <a:extLst>
+              <a:ext uri="{FF2B5EF4-FFF2-40B4-BE49-F238E27FC236}">
+                <a16:creationId xmlns:a16="http://schemas.microsoft.com/office/drawing/2014/main" id="{1932285D-6D49-4B3B-AD27-42335F32A5B3}"/>
+              </a:ext>
+            </a:extLst>
+          </p:cNvPr>
+          <p:cNvCxnSpPr>
+            <a:stCxn id="13" idx="2"/>
+            <a:endCxn id="41" idx="0"/>
+          </p:cNvCxnSpPr>
+          <p:nvPr/>
+        </p:nvCxnSpPr>
+        <p:spPr>
+          <a:xfrm rot="5400000">
+            <a:off x="2823373" y="9857211"/>
+            <a:ext cx="1270500" cy="2"/>
+          </a:xfrm>
+          <a:prstGeom prst="bentConnector3">
+            <a:avLst/>
+          </a:prstGeom>
+          <a:ln w="38100">
+            <a:tailEnd type="triangle"/>
+          </a:ln>
+        </p:spPr>
+        <p:style>
+          <a:lnRef idx="1">
+            <a:schemeClr val="accent1"/>
+          </a:lnRef>
+          <a:fillRef idx="0">
+            <a:schemeClr val="accent1"/>
+          </a:fillRef>
+          <a:effectRef idx="0">
+            <a:schemeClr val="accent1"/>
+          </a:effectRef>
+          <a:fontRef idx="minor">
+            <a:schemeClr val="tx1"/>
+          </a:fontRef>
+        </p:style>
+      </p:cxnSp>
+      <p:cxnSp>
+        <p:nvCxnSpPr>
+          <p:cNvPr id="50" name="Connector: Elbow 49">
+            <a:extLst>
+              <a:ext uri="{FF2B5EF4-FFF2-40B4-BE49-F238E27FC236}">
+                <a16:creationId xmlns:a16="http://schemas.microsoft.com/office/drawing/2014/main" id="{6266CFDC-4386-4C97-9C59-994FF373490D}"/>
+              </a:ext>
+            </a:extLst>
+          </p:cNvPr>
+          <p:cNvCxnSpPr>
+            <a:stCxn id="41" idx="2"/>
+            <a:endCxn id="42" idx="0"/>
+          </p:cNvCxnSpPr>
+          <p:nvPr/>
+        </p:nvCxnSpPr>
+        <p:spPr>
+          <a:xfrm rot="5400000">
+            <a:off x="3176748" y="11293855"/>
+            <a:ext cx="563748" cy="1"/>
+          </a:xfrm>
+          <a:prstGeom prst="bentConnector3">
+            <a:avLst/>
+          </a:prstGeom>
+          <a:ln w="38100">
+            <a:tailEnd type="triangle"/>
+          </a:ln>
+        </p:spPr>
+        <p:style>
+          <a:lnRef idx="1">
+            <a:schemeClr val="accent1"/>
+          </a:lnRef>
+          <a:fillRef idx="0">
+            <a:schemeClr val="accent1"/>
+          </a:fillRef>
+          <a:effectRef idx="0">
+            <a:schemeClr val="accent1"/>
+          </a:effectRef>
+          <a:fontRef idx="minor">
+            <a:schemeClr val="tx1"/>
+          </a:fontRef>
+        </p:style>
+      </p:cxnSp>
+      <p:cxnSp>
+        <p:nvCxnSpPr>
+          <p:cNvPr id="55" name="Connector: Elbow 54">
+            <a:extLst>
+              <a:ext uri="{FF2B5EF4-FFF2-40B4-BE49-F238E27FC236}">
+                <a16:creationId xmlns:a16="http://schemas.microsoft.com/office/drawing/2014/main" id="{71B7277C-5B12-4D60-BEA0-5F241E274BF5}"/>
+              </a:ext>
+            </a:extLst>
+          </p:cNvPr>
+          <p:cNvCxnSpPr>
+            <a:stCxn id="42" idx="2"/>
+            <a:endCxn id="31" idx="1"/>
+          </p:cNvCxnSpPr>
+          <p:nvPr/>
+        </p:nvCxnSpPr>
+        <p:spPr>
+          <a:xfrm rot="5400000" flipH="1">
+            <a:off x="-908695" y="7727932"/>
+            <a:ext cx="7689604" cy="1045028"/>
+          </a:xfrm>
+          <a:prstGeom prst="bentConnector4">
+            <a:avLst>
+              <a:gd name="adj1" fmla="val -2973"/>
+              <a:gd name="adj2" fmla="val 246003"/>
+            </a:avLst>
+          </a:prstGeom>
+          <a:ln w="38100">
+            <a:tailEnd type="triangle"/>
+          </a:ln>
+        </p:spPr>
+        <p:style>
+          <a:lnRef idx="1">
+            <a:schemeClr val="accent1"/>
+          </a:lnRef>
+          <a:fillRef idx="0">
+            <a:schemeClr val="accent1"/>
+          </a:fillRef>
+          <a:effectRef idx="0">
+            <a:schemeClr val="accent1"/>
+          </a:effectRef>
+          <a:fontRef idx="minor">
+            <a:schemeClr val="tx1"/>
+          </a:fontRef>
+        </p:style>
+      </p:cxnSp>
+      <p:cxnSp>
+        <p:nvCxnSpPr>
+          <p:cNvPr id="78" name="Connector: Elbow 77">
+            <a:extLst>
+              <a:ext uri="{FF2B5EF4-FFF2-40B4-BE49-F238E27FC236}">
+                <a16:creationId xmlns:a16="http://schemas.microsoft.com/office/drawing/2014/main" id="{72B75C77-773E-45CC-9688-C23051AC86EC}"/>
+              </a:ext>
+            </a:extLst>
+          </p:cNvPr>
+          <p:cNvCxnSpPr>
+            <a:stCxn id="60" idx="1"/>
+            <a:endCxn id="15" idx="3"/>
+          </p:cNvCxnSpPr>
+          <p:nvPr/>
+        </p:nvCxnSpPr>
+        <p:spPr>
+          <a:xfrm rot="10800000" flipV="1">
+            <a:off x="8839957" y="8644763"/>
+            <a:ext cx="2246266" cy="850099"/>
+          </a:xfrm>
+          <a:prstGeom prst="bentConnector3">
+            <a:avLst/>
+          </a:prstGeom>
+          <a:ln w="38100">
+            <a:solidFill>
+              <a:srgbClr val="FF0000"/>
+            </a:solidFill>
+            <a:prstDash val="sysDot"/>
+            <a:tailEnd type="triangle"/>
+          </a:ln>
+        </p:spPr>
+        <p:style>
+          <a:lnRef idx="1">
+            <a:schemeClr val="accent1"/>
+          </a:lnRef>
+          <a:fillRef idx="0">
+            <a:schemeClr val="accent1"/>
+          </a:fillRef>
+          <a:effectRef idx="0">
+            <a:schemeClr val="accent1"/>
+          </a:effectRef>
+          <a:fontRef idx="minor">
+            <a:schemeClr val="tx1"/>
+          </a:fontRef>
+        </p:style>
+      </p:cxnSp>
+      <p:cxnSp>
+        <p:nvCxnSpPr>
+          <p:cNvPr id="72" name="Connector: Elbow 71">
+            <a:extLst>
+              <a:ext uri="{FF2B5EF4-FFF2-40B4-BE49-F238E27FC236}">
+                <a16:creationId xmlns:a16="http://schemas.microsoft.com/office/drawing/2014/main" id="{CD806686-50BB-49C3-99A4-EEAFC1FBB2B9}"/>
+              </a:ext>
+            </a:extLst>
+          </p:cNvPr>
+          <p:cNvCxnSpPr>
+            <a:stCxn id="59" idx="1"/>
+            <a:endCxn id="9" idx="3"/>
+          </p:cNvCxnSpPr>
+          <p:nvPr/>
+        </p:nvCxnSpPr>
+        <p:spPr>
+          <a:xfrm rot="10800000">
+            <a:off x="8839964" y="6908118"/>
+            <a:ext cx="2246258" cy="1"/>
+          </a:xfrm>
+          <a:prstGeom prst="bentConnector3">
+            <a:avLst/>
+          </a:prstGeom>
+          <a:ln w="38100">
+            <a:solidFill>
+              <a:srgbClr val="00B050"/>
+            </a:solidFill>
+            <a:prstDash val="sysDot"/>
+            <a:tailEnd type="triangle"/>
+          </a:ln>
+        </p:spPr>
+        <p:style>
+          <a:lnRef idx="1">
+            <a:schemeClr val="accent1"/>
+          </a:lnRef>
+          <a:fillRef idx="0">
+            <a:schemeClr val="accent1"/>
+          </a:fillRef>
+          <a:effectRef idx="0">
+            <a:schemeClr val="accent1"/>
+          </a:effectRef>
+          <a:fontRef idx="minor">
+            <a:schemeClr val="tx1"/>
+          </a:fontRef>
+        </p:style>
+      </p:cxnSp>
+      <p:cxnSp>
+        <p:nvCxnSpPr>
+          <p:cNvPr id="74" name="Connector: Elbow 73">
+            <a:extLst>
+              <a:ext uri="{FF2B5EF4-FFF2-40B4-BE49-F238E27FC236}">
+                <a16:creationId xmlns:a16="http://schemas.microsoft.com/office/drawing/2014/main" id="{2AB84941-1BCB-44B0-8ACD-014D97ABA07B}"/>
+              </a:ext>
+            </a:extLst>
+          </p:cNvPr>
+          <p:cNvCxnSpPr>
+            <a:stCxn id="60" idx="1"/>
+            <a:endCxn id="14" idx="3"/>
+          </p:cNvCxnSpPr>
+          <p:nvPr/>
+        </p:nvCxnSpPr>
+        <p:spPr>
+          <a:xfrm rot="10800000">
+            <a:off x="8839959" y="8638204"/>
+            <a:ext cx="2246265" cy="6561"/>
+          </a:xfrm>
+          <a:prstGeom prst="bentConnector3">
+            <a:avLst/>
+          </a:prstGeom>
+          <a:ln w="38100">
+            <a:solidFill>
+              <a:srgbClr val="00B050"/>
+            </a:solidFill>
+            <a:prstDash val="sysDot"/>
+            <a:tailEnd type="triangle"/>
+          </a:ln>
+        </p:spPr>
+        <p:style>
+          <a:lnRef idx="1">
+            <a:schemeClr val="accent1"/>
+          </a:lnRef>
+          <a:fillRef idx="0">
+            <a:schemeClr val="accent1"/>
+          </a:fillRef>
+          <a:effectRef idx="0">
+            <a:schemeClr val="accent1"/>
+          </a:effectRef>
+          <a:fontRef idx="minor">
+            <a:schemeClr val="tx1"/>
+          </a:fontRef>
+        </p:style>
+      </p:cxnSp>
+      <p:sp>
+        <p:nvSpPr>
+          <p:cNvPr id="57" name="Flowchart: Process 56">
+            <a:extLst>
+              <a:ext uri="{FF2B5EF4-FFF2-40B4-BE49-F238E27FC236}">
+                <a16:creationId xmlns:a16="http://schemas.microsoft.com/office/drawing/2014/main" id="{A300B1F5-239B-4FF3-A6D2-DDED1E214CD8}"/>
+              </a:ext>
+            </a:extLst>
+          </p:cNvPr>
+          <p:cNvSpPr/>
+          <p:nvPr/>
+        </p:nvSpPr>
+        <p:spPr>
+          <a:xfrm>
+            <a:off x="11086222" y="3046952"/>
+            <a:ext cx="2090057" cy="519519"/>
+          </a:xfrm>
+          <a:prstGeom prst="flowChartProcess">
+            <a:avLst/>
+          </a:prstGeom>
+        </p:spPr>
+        <p:style>
+          <a:lnRef idx="2">
+            <a:schemeClr val="accent1">
+              <a:shade val="50000"/>
+            </a:schemeClr>
+          </a:lnRef>
+          <a:fillRef idx="1">
+            <a:schemeClr val="accent1"/>
+          </a:fillRef>
+          <a:effectRef idx="0">
+            <a:schemeClr val="accent1"/>
+          </a:effectRef>
+          <a:fontRef idx="minor">
+            <a:schemeClr val="lt1"/>
+          </a:fontRef>
+        </p:style>
+        <p:txBody>
+          <a:bodyPr rtlCol="0" anchor="ctr"/>
+          <a:lstStyle/>
+          <a:p>
+            <a:pPr algn="ctr"/>
+            <a:r>
+              <a:rPr lang="en-US" dirty="0"/>
+              <a:t>Start Thread 2</a:t>
+            </a:r>
+          </a:p>
+        </p:txBody>
+      </p:sp>
+      <p:sp>
+        <p:nvSpPr>
+          <p:cNvPr id="58" name="Flowchart: Process 57">
+            <a:extLst>
+              <a:ext uri="{FF2B5EF4-FFF2-40B4-BE49-F238E27FC236}">
+                <a16:creationId xmlns:a16="http://schemas.microsoft.com/office/drawing/2014/main" id="{8A6FF4D4-3B0F-4356-951D-7942628A3BFF}"/>
+              </a:ext>
+            </a:extLst>
+          </p:cNvPr>
+          <p:cNvSpPr/>
+          <p:nvPr/>
+        </p:nvSpPr>
+        <p:spPr>
+          <a:xfrm>
+            <a:off x="11086223" y="5229151"/>
+            <a:ext cx="2090057" cy="519519"/>
+          </a:xfrm>
+          <a:prstGeom prst="flowChartProcess">
+            <a:avLst/>
+          </a:prstGeom>
+        </p:spPr>
+        <p:style>
+          <a:lnRef idx="2">
+            <a:schemeClr val="accent1">
+              <a:shade val="50000"/>
+            </a:schemeClr>
+          </a:lnRef>
+          <a:fillRef idx="1">
+            <a:schemeClr val="accent1"/>
+          </a:fillRef>
+          <a:effectRef idx="0">
+            <a:schemeClr val="accent1"/>
+          </a:effectRef>
+          <a:fontRef idx="minor">
+            <a:schemeClr val="lt1"/>
+          </a:fontRef>
+        </p:style>
+        <p:txBody>
+          <a:bodyPr rtlCol="0" anchor="ctr"/>
+          <a:lstStyle/>
+          <a:p>
+            <a:pPr algn="ctr"/>
+            <a:r>
+              <a:rPr lang="en-US" dirty="0"/>
+              <a:t>Read sensor signal</a:t>
+            </a:r>
+          </a:p>
+        </p:txBody>
+      </p:sp>
+      <p:sp>
+        <p:nvSpPr>
+          <p:cNvPr id="59" name="Flowchart: Decision 58">
+            <a:extLst>
+              <a:ext uri="{FF2B5EF4-FFF2-40B4-BE49-F238E27FC236}">
+                <a16:creationId xmlns:a16="http://schemas.microsoft.com/office/drawing/2014/main" id="{96C5DFAF-2AA1-4AB4-BFF1-F31F7588CD19}"/>
+              </a:ext>
+            </a:extLst>
+          </p:cNvPr>
+          <p:cNvSpPr/>
+          <p:nvPr/>
+        </p:nvSpPr>
+        <p:spPr>
+          <a:xfrm>
+            <a:off x="11086222" y="6330919"/>
+            <a:ext cx="2090057" cy="1154397"/>
+          </a:xfrm>
+          <a:prstGeom prst="flowChartDecision">
+            <a:avLst/>
+          </a:prstGeom>
+        </p:spPr>
+        <p:style>
+          <a:lnRef idx="2">
+            <a:schemeClr val="accent1">
+              <a:shade val="50000"/>
+            </a:schemeClr>
+          </a:lnRef>
+          <a:fillRef idx="1">
+            <a:schemeClr val="accent1"/>
+          </a:fillRef>
+          <a:effectRef idx="0">
+            <a:schemeClr val="accent1"/>
+          </a:effectRef>
+          <a:fontRef idx="minor">
+            <a:schemeClr val="lt1"/>
+          </a:fontRef>
+        </p:style>
+        <p:txBody>
+          <a:bodyPr rtlCol="0" anchor="ctr"/>
+          <a:lstStyle/>
+          <a:p>
+            <a:pPr algn="ctr"/>
+            <a:r>
+              <a:rPr lang="en-US" dirty="0"/>
+              <a:t>Did it ping vole 1?</a:t>
+            </a:r>
+          </a:p>
+        </p:txBody>
+      </p:sp>
+      <p:sp>
+        <p:nvSpPr>
+          <p:cNvPr id="60" name="Flowchart: Decision 59">
+            <a:extLst>
+              <a:ext uri="{FF2B5EF4-FFF2-40B4-BE49-F238E27FC236}">
+                <a16:creationId xmlns:a16="http://schemas.microsoft.com/office/drawing/2014/main" id="{03D06A7B-1056-427C-85D3-6C681DC3A949}"/>
+              </a:ext>
+            </a:extLst>
+          </p:cNvPr>
+          <p:cNvSpPr/>
+          <p:nvPr/>
+        </p:nvSpPr>
+        <p:spPr>
+          <a:xfrm>
+            <a:off x="11086223" y="8067565"/>
+            <a:ext cx="2090057" cy="1154397"/>
+          </a:xfrm>
+          <a:prstGeom prst="flowChartDecision">
+            <a:avLst/>
+          </a:prstGeom>
+        </p:spPr>
+        <p:style>
+          <a:lnRef idx="2">
+            <a:schemeClr val="accent1">
+              <a:shade val="50000"/>
+            </a:schemeClr>
+          </a:lnRef>
+          <a:fillRef idx="1">
+            <a:schemeClr val="accent1"/>
+          </a:fillRef>
+          <a:effectRef idx="0">
+            <a:schemeClr val="accent1"/>
+          </a:effectRef>
+          <a:fontRef idx="minor">
+            <a:schemeClr val="lt1"/>
+          </a:fontRef>
+        </p:style>
+        <p:txBody>
+          <a:bodyPr rtlCol="0" anchor="ctr"/>
+          <a:lstStyle/>
+          <a:p>
+            <a:pPr algn="ctr"/>
+            <a:r>
+              <a:rPr lang="en-US" dirty="0"/>
+              <a:t>Did it ping vole 2?</a:t>
+            </a:r>
+          </a:p>
+        </p:txBody>
+      </p:sp>
+      <p:cxnSp>
+        <p:nvCxnSpPr>
+          <p:cNvPr id="61" name="Connector: Elbow 60">
+            <a:extLst>
+              <a:ext uri="{FF2B5EF4-FFF2-40B4-BE49-F238E27FC236}">
+                <a16:creationId xmlns:a16="http://schemas.microsoft.com/office/drawing/2014/main" id="{56A7C35F-F975-4F5F-96F0-484D92116BF5}"/>
+              </a:ext>
+            </a:extLst>
+          </p:cNvPr>
+          <p:cNvCxnSpPr>
+            <a:stCxn id="58" idx="2"/>
+            <a:endCxn id="59" idx="0"/>
+          </p:cNvCxnSpPr>
+          <p:nvPr/>
+        </p:nvCxnSpPr>
+        <p:spPr>
+          <a:xfrm rot="5400000">
+            <a:off x="11840128" y="6039794"/>
+            <a:ext cx="582249" cy="1"/>
+          </a:xfrm>
+          <a:prstGeom prst="bentConnector3">
+            <a:avLst/>
+          </a:prstGeom>
+          <a:ln w="38100">
+            <a:tailEnd type="triangle"/>
+          </a:ln>
+        </p:spPr>
+        <p:style>
+          <a:lnRef idx="1">
+            <a:schemeClr val="accent1"/>
+          </a:lnRef>
+          <a:fillRef idx="0">
+            <a:schemeClr val="accent1"/>
+          </a:fillRef>
+          <a:effectRef idx="0">
+            <a:schemeClr val="accent1"/>
+          </a:effectRef>
+          <a:fontRef idx="minor">
+            <a:schemeClr val="tx1"/>
+          </a:fontRef>
+        </p:style>
+      </p:cxnSp>
+      <p:cxnSp>
+        <p:nvCxnSpPr>
+          <p:cNvPr id="62" name="Connector: Elbow 61">
+            <a:extLst>
+              <a:ext uri="{FF2B5EF4-FFF2-40B4-BE49-F238E27FC236}">
+                <a16:creationId xmlns:a16="http://schemas.microsoft.com/office/drawing/2014/main" id="{0367CF87-FE27-450E-95D8-F7FF9867C747}"/>
+              </a:ext>
+            </a:extLst>
+          </p:cNvPr>
+          <p:cNvCxnSpPr>
+            <a:stCxn id="59" idx="2"/>
+            <a:endCxn id="60" idx="0"/>
+          </p:cNvCxnSpPr>
+          <p:nvPr/>
+        </p:nvCxnSpPr>
+        <p:spPr>
+          <a:xfrm rot="16200000" flipH="1">
+            <a:off x="11840127" y="7776439"/>
+            <a:ext cx="582249" cy="1"/>
+          </a:xfrm>
+          <a:prstGeom prst="bentConnector3">
+            <a:avLst/>
+          </a:prstGeom>
+          <a:ln w="38100">
+            <a:tailEnd type="triangle"/>
+          </a:ln>
+        </p:spPr>
+        <p:style>
+          <a:lnRef idx="1">
+            <a:schemeClr val="accent1"/>
+          </a:lnRef>
+          <a:fillRef idx="0">
+            <a:schemeClr val="accent1"/>
+          </a:fillRef>
+          <a:effectRef idx="0">
+            <a:schemeClr val="accent1"/>
+          </a:effectRef>
+          <a:fontRef idx="minor">
+            <a:schemeClr val="tx1"/>
+          </a:fontRef>
+        </p:style>
+      </p:cxnSp>
+      <p:sp>
+        <p:nvSpPr>
+          <p:cNvPr id="63" name="Flowchart: Process 62">
+            <a:extLst>
+              <a:ext uri="{FF2B5EF4-FFF2-40B4-BE49-F238E27FC236}">
+                <a16:creationId xmlns:a16="http://schemas.microsoft.com/office/drawing/2014/main" id="{95A8F9BE-44DE-445A-96D8-AD96D46A490A}"/>
+              </a:ext>
+            </a:extLst>
+          </p:cNvPr>
+          <p:cNvSpPr/>
+          <p:nvPr/>
+        </p:nvSpPr>
+        <p:spPr>
+          <a:xfrm>
+            <a:off x="11086221" y="4145884"/>
+            <a:ext cx="2090057" cy="519519"/>
+          </a:xfrm>
+          <a:prstGeom prst="flowChartProcess">
+            <a:avLst/>
+          </a:prstGeom>
+        </p:spPr>
+        <p:style>
+          <a:lnRef idx="2">
+            <a:schemeClr val="accent1">
+              <a:shade val="50000"/>
+            </a:schemeClr>
+          </a:lnRef>
+          <a:fillRef idx="1">
+            <a:schemeClr val="accent1"/>
+          </a:fillRef>
+          <a:effectRef idx="0">
+            <a:schemeClr val="accent1"/>
+          </a:effectRef>
+          <a:fontRef idx="minor">
+            <a:schemeClr val="lt1"/>
+          </a:fontRef>
+        </p:style>
+        <p:txBody>
+          <a:bodyPr rtlCol="0" anchor="ctr"/>
+          <a:lstStyle/>
+          <a:p>
+            <a:pPr algn="ctr"/>
+            <a:r>
+              <a:rPr lang="en-US" dirty="0"/>
+              <a:t>Set event to FALSE</a:t>
+            </a:r>
+          </a:p>
+        </p:txBody>
+      </p:sp>
+      <p:cxnSp>
+        <p:nvCxnSpPr>
+          <p:cNvPr id="64" name="Straight Arrow Connector 63">
+            <a:extLst>
+              <a:ext uri="{FF2B5EF4-FFF2-40B4-BE49-F238E27FC236}">
+                <a16:creationId xmlns:a16="http://schemas.microsoft.com/office/drawing/2014/main" id="{55471AEF-0E14-466F-A6E7-608480AFECAD}"/>
+              </a:ext>
+            </a:extLst>
+          </p:cNvPr>
+          <p:cNvCxnSpPr>
+            <a:stCxn id="57" idx="2"/>
+            <a:endCxn id="63" idx="0"/>
+          </p:cNvCxnSpPr>
+          <p:nvPr/>
+        </p:nvCxnSpPr>
+        <p:spPr>
+          <a:xfrm flipH="1">
+            <a:off x="12131250" y="3566471"/>
+            <a:ext cx="1" cy="579413"/>
+          </a:xfrm>
+          <a:prstGeom prst="straightConnector1">
+            <a:avLst/>
+          </a:prstGeom>
+          <a:ln w="38100">
+            <a:tailEnd type="triangle"/>
+          </a:ln>
+        </p:spPr>
+        <p:style>
+          <a:lnRef idx="1">
+            <a:schemeClr val="accent1"/>
+          </a:lnRef>
+          <a:fillRef idx="0">
+            <a:schemeClr val="accent1"/>
+          </a:fillRef>
+          <a:effectRef idx="0">
+            <a:schemeClr val="accent1"/>
+          </a:effectRef>
+          <a:fontRef idx="minor">
+            <a:schemeClr val="tx1"/>
+          </a:fontRef>
+        </p:style>
+      </p:cxnSp>
+      <p:cxnSp>
+        <p:nvCxnSpPr>
+          <p:cNvPr id="65" name="Connector: Elbow 64">
+            <a:extLst>
+              <a:ext uri="{FF2B5EF4-FFF2-40B4-BE49-F238E27FC236}">
+                <a16:creationId xmlns:a16="http://schemas.microsoft.com/office/drawing/2014/main" id="{5EFD2EC7-8FA5-4424-A8B5-E0E58A8B980D}"/>
+              </a:ext>
+            </a:extLst>
+          </p:cNvPr>
+          <p:cNvCxnSpPr>
+            <a:stCxn id="63" idx="2"/>
+            <a:endCxn id="58" idx="0"/>
+          </p:cNvCxnSpPr>
+          <p:nvPr/>
+        </p:nvCxnSpPr>
+        <p:spPr>
+          <a:xfrm rot="16200000" flipH="1">
+            <a:off x="11849377" y="4947276"/>
+            <a:ext cx="563748" cy="2"/>
+          </a:xfrm>
+          <a:prstGeom prst="bentConnector3">
+            <a:avLst/>
+          </a:prstGeom>
+          <a:ln w="38100">
+            <a:tailEnd type="triangle"/>
+          </a:ln>
+        </p:spPr>
+        <p:style>
+          <a:lnRef idx="1">
+            <a:schemeClr val="accent1"/>
+          </a:lnRef>
+          <a:fillRef idx="0">
+            <a:schemeClr val="accent1"/>
+          </a:fillRef>
+          <a:effectRef idx="0">
+            <a:schemeClr val="accent1"/>
+          </a:effectRef>
+          <a:fontRef idx="minor">
+            <a:schemeClr val="tx1"/>
+          </a:fontRef>
+        </p:style>
+      </p:cxnSp>
+      <p:sp>
+        <p:nvSpPr>
+          <p:cNvPr id="66" name="Flowchart: Process 65">
+            <a:extLst>
+              <a:ext uri="{FF2B5EF4-FFF2-40B4-BE49-F238E27FC236}">
+                <a16:creationId xmlns:a16="http://schemas.microsoft.com/office/drawing/2014/main" id="{E8566C4C-6DE3-4493-BC44-00386531AD4C}"/>
+              </a:ext>
+            </a:extLst>
+          </p:cNvPr>
+          <p:cNvSpPr/>
+          <p:nvPr/>
+        </p:nvSpPr>
+        <p:spPr>
+          <a:xfrm>
+            <a:off x="11086221" y="10492462"/>
+            <a:ext cx="2090057" cy="519519"/>
+          </a:xfrm>
+          <a:prstGeom prst="flowChartProcess">
+            <a:avLst/>
+          </a:prstGeom>
+        </p:spPr>
+        <p:style>
+          <a:lnRef idx="2">
+            <a:schemeClr val="accent1">
+              <a:shade val="50000"/>
+            </a:schemeClr>
+          </a:lnRef>
+          <a:fillRef idx="1">
+            <a:schemeClr val="accent1"/>
+          </a:fillRef>
+          <a:effectRef idx="0">
+            <a:schemeClr val="accent1"/>
+          </a:effectRef>
+          <a:fontRef idx="minor">
+            <a:schemeClr val="lt1"/>
+          </a:fontRef>
+        </p:style>
+        <p:txBody>
+          <a:bodyPr rtlCol="0" anchor="ctr"/>
+          <a:lstStyle/>
+          <a:p>
+            <a:pPr algn="ctr"/>
+            <a:r>
+              <a:rPr lang="en-US" dirty="0"/>
+              <a:t>Set event to TRUE</a:t>
+            </a:r>
+          </a:p>
+        </p:txBody>
+      </p:sp>
+      <p:sp>
+        <p:nvSpPr>
+          <p:cNvPr id="67" name="Flowchart: Process 66">
+            <a:extLst>
+              <a:ext uri="{FF2B5EF4-FFF2-40B4-BE49-F238E27FC236}">
+                <a16:creationId xmlns:a16="http://schemas.microsoft.com/office/drawing/2014/main" id="{F9642ED0-698E-418A-BE46-0C575C4CBA13}"/>
+              </a:ext>
+            </a:extLst>
+          </p:cNvPr>
+          <p:cNvSpPr/>
+          <p:nvPr/>
+        </p:nvSpPr>
+        <p:spPr>
+          <a:xfrm>
+            <a:off x="11086220" y="11575729"/>
+            <a:ext cx="2090057" cy="519519"/>
+          </a:xfrm>
+          <a:prstGeom prst="flowChartProcess">
+            <a:avLst/>
+          </a:prstGeom>
+        </p:spPr>
+        <p:style>
+          <a:lnRef idx="2">
+            <a:schemeClr val="accent1">
+              <a:shade val="50000"/>
+            </a:schemeClr>
+          </a:lnRef>
+          <a:fillRef idx="1">
+            <a:schemeClr val="accent1"/>
+          </a:fillRef>
+          <a:effectRef idx="0">
+            <a:schemeClr val="accent1"/>
+          </a:effectRef>
+          <a:fontRef idx="minor">
+            <a:schemeClr val="lt1"/>
+          </a:fontRef>
+        </p:style>
+        <p:txBody>
+          <a:bodyPr rtlCol="0" anchor="ctr"/>
+          <a:lstStyle/>
+          <a:p>
+            <a:pPr algn="ctr"/>
+            <a:r>
+              <a:rPr lang="en-US" dirty="0"/>
+              <a:t>WAIT for Main Event</a:t>
+            </a:r>
+          </a:p>
+        </p:txBody>
+      </p:sp>
+      <p:cxnSp>
+        <p:nvCxnSpPr>
+          <p:cNvPr id="68" name="Connector: Elbow 67">
+            <a:extLst>
+              <a:ext uri="{FF2B5EF4-FFF2-40B4-BE49-F238E27FC236}">
+                <a16:creationId xmlns:a16="http://schemas.microsoft.com/office/drawing/2014/main" id="{CC7497C3-53B5-41E1-AF8E-895E639AD546}"/>
+              </a:ext>
+            </a:extLst>
+          </p:cNvPr>
+          <p:cNvCxnSpPr>
+            <a:stCxn id="60" idx="2"/>
+            <a:endCxn id="66" idx="0"/>
+          </p:cNvCxnSpPr>
+          <p:nvPr/>
+        </p:nvCxnSpPr>
+        <p:spPr>
+          <a:xfrm rot="5400000">
+            <a:off x="11496001" y="9857211"/>
+            <a:ext cx="1270500" cy="2"/>
+          </a:xfrm>
+          <a:prstGeom prst="bentConnector3">
+            <a:avLst/>
+          </a:prstGeom>
+          <a:ln w="38100">
+            <a:tailEnd type="triangle"/>
+          </a:ln>
+        </p:spPr>
+        <p:style>
+          <a:lnRef idx="1">
+            <a:schemeClr val="accent1"/>
+          </a:lnRef>
+          <a:fillRef idx="0">
+            <a:schemeClr val="accent1"/>
+          </a:fillRef>
+          <a:effectRef idx="0">
+            <a:schemeClr val="accent1"/>
+          </a:effectRef>
+          <a:fontRef idx="minor">
+            <a:schemeClr val="tx1"/>
+          </a:fontRef>
+        </p:style>
+      </p:cxnSp>
+      <p:cxnSp>
+        <p:nvCxnSpPr>
+          <p:cNvPr id="69" name="Connector: Elbow 68">
+            <a:extLst>
+              <a:ext uri="{FF2B5EF4-FFF2-40B4-BE49-F238E27FC236}">
+                <a16:creationId xmlns:a16="http://schemas.microsoft.com/office/drawing/2014/main" id="{45600D0F-1784-47D4-8125-4AFE27627ED2}"/>
+              </a:ext>
+            </a:extLst>
+          </p:cNvPr>
+          <p:cNvCxnSpPr>
+            <a:stCxn id="66" idx="2"/>
+            <a:endCxn id="67" idx="0"/>
+          </p:cNvCxnSpPr>
+          <p:nvPr/>
+        </p:nvCxnSpPr>
+        <p:spPr>
+          <a:xfrm rot="5400000">
+            <a:off x="11849376" y="11293855"/>
+            <a:ext cx="563748" cy="1"/>
+          </a:xfrm>
+          <a:prstGeom prst="bentConnector3">
+            <a:avLst/>
+          </a:prstGeom>
+          <a:ln w="38100">
+            <a:tailEnd type="triangle"/>
+          </a:ln>
+        </p:spPr>
+        <p:style>
+          <a:lnRef idx="1">
+            <a:schemeClr val="accent1"/>
+          </a:lnRef>
+          <a:fillRef idx="0">
+            <a:schemeClr val="accent1"/>
+          </a:fillRef>
+          <a:effectRef idx="0">
+            <a:schemeClr val="accent1"/>
+          </a:effectRef>
+          <a:fontRef idx="minor">
+            <a:schemeClr val="tx1"/>
+          </a:fontRef>
+        </p:style>
+      </p:cxnSp>
+      <p:cxnSp>
+        <p:nvCxnSpPr>
+          <p:cNvPr id="87" name="Connector: Elbow 86">
+            <a:extLst>
+              <a:ext uri="{FF2B5EF4-FFF2-40B4-BE49-F238E27FC236}">
+                <a16:creationId xmlns:a16="http://schemas.microsoft.com/office/drawing/2014/main" id="{DBDDD432-385C-46E9-B495-733F2E9B0449}"/>
+              </a:ext>
+            </a:extLst>
+          </p:cNvPr>
+          <p:cNvCxnSpPr>
+            <a:cxnSpLocks/>
+            <a:stCxn id="67" idx="2"/>
+            <a:endCxn id="63" idx="3"/>
+          </p:cNvCxnSpPr>
+          <p:nvPr/>
+        </p:nvCxnSpPr>
+        <p:spPr>
+          <a:xfrm rot="5400000" flipH="1" flipV="1">
+            <a:off x="8808961" y="7727931"/>
+            <a:ext cx="7689604" cy="1045029"/>
+          </a:xfrm>
+          <a:prstGeom prst="bentConnector4">
+            <a:avLst>
+              <a:gd name="adj1" fmla="val -2973"/>
+              <a:gd name="adj2" fmla="val 246003"/>
+            </a:avLst>
+          </a:prstGeom>
+          <a:ln w="38100">
+            <a:tailEnd type="triangle"/>
+          </a:ln>
+        </p:spPr>
+        <p:style>
+          <a:lnRef idx="1">
+            <a:schemeClr val="accent1"/>
+          </a:lnRef>
+          <a:fillRef idx="0">
+            <a:schemeClr val="accent1"/>
+          </a:fillRef>
+          <a:effectRef idx="0">
+            <a:schemeClr val="accent1"/>
+          </a:effectRef>
+          <a:fontRef idx="minor">
+            <a:schemeClr val="tx1"/>
+          </a:fontRef>
+        </p:style>
+      </p:cxnSp>
+      <p:sp>
+        <p:nvSpPr>
+          <p:cNvPr id="106" name="Flowchart: Process 105">
+            <a:extLst>
+              <a:ext uri="{FF2B5EF4-FFF2-40B4-BE49-F238E27FC236}">
+                <a16:creationId xmlns:a16="http://schemas.microsoft.com/office/drawing/2014/main" id="{7C18C280-2EC7-43D3-BAD9-C290958A4052}"/>
+              </a:ext>
+            </a:extLst>
+          </p:cNvPr>
+          <p:cNvSpPr/>
+          <p:nvPr/>
+        </p:nvSpPr>
+        <p:spPr>
+          <a:xfrm>
+            <a:off x="16467563" y="3046952"/>
+            <a:ext cx="2090057" cy="519519"/>
+          </a:xfrm>
+          <a:prstGeom prst="flowChartProcess">
+            <a:avLst/>
+          </a:prstGeom>
+        </p:spPr>
+        <p:style>
+          <a:lnRef idx="2">
+            <a:schemeClr val="accent1">
+              <a:shade val="50000"/>
+            </a:schemeClr>
+          </a:lnRef>
+          <a:fillRef idx="1">
+            <a:schemeClr val="accent1"/>
+          </a:fillRef>
+          <a:effectRef idx="0">
+            <a:schemeClr val="accent1"/>
+          </a:effectRef>
+          <a:fontRef idx="minor">
+            <a:schemeClr val="lt1"/>
+          </a:fontRef>
+        </p:style>
+        <p:txBody>
+          <a:bodyPr rtlCol="0" anchor="ctr"/>
+          <a:lstStyle/>
+          <a:p>
+            <a:pPr algn="ctr"/>
+            <a:r>
+              <a:rPr lang="en-US" dirty="0"/>
+              <a:t>Start Schedule Thread</a:t>
+            </a:r>
+          </a:p>
+        </p:txBody>
+      </p:sp>
+      <p:sp>
+        <p:nvSpPr>
+          <p:cNvPr id="107" name="Flowchart: Process 106">
+            <a:extLst>
+              <a:ext uri="{FF2B5EF4-FFF2-40B4-BE49-F238E27FC236}">
+                <a16:creationId xmlns:a16="http://schemas.microsoft.com/office/drawing/2014/main" id="{D18B9DAD-7571-4EC6-B476-9FFF483DE12C}"/>
+              </a:ext>
+            </a:extLst>
+          </p:cNvPr>
+          <p:cNvSpPr/>
+          <p:nvPr/>
+        </p:nvSpPr>
+        <p:spPr>
+          <a:xfrm>
+            <a:off x="16497172" y="5179146"/>
+            <a:ext cx="2090057" cy="519519"/>
+          </a:xfrm>
+          <a:prstGeom prst="flowChartProcess">
+            <a:avLst/>
+          </a:prstGeom>
+        </p:spPr>
+        <p:style>
+          <a:lnRef idx="2">
+            <a:schemeClr val="accent1">
+              <a:shade val="50000"/>
+            </a:schemeClr>
+          </a:lnRef>
+          <a:fillRef idx="1">
+            <a:schemeClr val="accent1"/>
+          </a:fillRef>
+          <a:effectRef idx="0">
+            <a:schemeClr val="accent1"/>
+          </a:effectRef>
+          <a:fontRef idx="minor">
+            <a:schemeClr val="lt1"/>
+          </a:fontRef>
+        </p:style>
+        <p:txBody>
+          <a:bodyPr rtlCol="0" anchor="ctr"/>
+          <a:lstStyle/>
+          <a:p>
+            <a:pPr algn="ctr"/>
+            <a:r>
+              <a:rPr lang="en-US" dirty="0"/>
+              <a:t>Set Main Event to FASLE</a:t>
+            </a:r>
+          </a:p>
+        </p:txBody>
+      </p:sp>
+      <p:sp>
+        <p:nvSpPr>
+          <p:cNvPr id="108" name="Flowchart: Process 107">
+            <a:extLst>
+              <a:ext uri="{FF2B5EF4-FFF2-40B4-BE49-F238E27FC236}">
+                <a16:creationId xmlns:a16="http://schemas.microsoft.com/office/drawing/2014/main" id="{2AF955FE-FD4F-4704-90E4-A3D9497C8041}"/>
+              </a:ext>
+            </a:extLst>
+          </p:cNvPr>
+          <p:cNvSpPr/>
+          <p:nvPr/>
+        </p:nvSpPr>
+        <p:spPr>
+          <a:xfrm>
+            <a:off x="16497172" y="7311340"/>
+            <a:ext cx="2090057" cy="519519"/>
+          </a:xfrm>
+          <a:prstGeom prst="flowChartProcess">
+            <a:avLst/>
+          </a:prstGeom>
+        </p:spPr>
+        <p:style>
+          <a:lnRef idx="2">
+            <a:schemeClr val="accent1">
+              <a:shade val="50000"/>
+            </a:schemeClr>
+          </a:lnRef>
+          <a:fillRef idx="1">
+            <a:schemeClr val="accent1"/>
+          </a:fillRef>
+          <a:effectRef idx="0">
+            <a:schemeClr val="accent1"/>
+          </a:effectRef>
+          <a:fontRef idx="minor">
+            <a:schemeClr val="lt1"/>
+          </a:fontRef>
+        </p:style>
+        <p:txBody>
+          <a:bodyPr rtlCol="0" anchor="ctr"/>
+          <a:lstStyle/>
+          <a:p>
+            <a:pPr algn="ctr"/>
+            <a:r>
+              <a:rPr lang="en-US" dirty="0"/>
+              <a:t>WAIT for thread1 event</a:t>
+            </a:r>
+          </a:p>
+        </p:txBody>
+      </p:sp>
+      <p:sp>
+        <p:nvSpPr>
+          <p:cNvPr id="109" name="Flowchart: Process 108">
+            <a:extLst>
+              <a:ext uri="{FF2B5EF4-FFF2-40B4-BE49-F238E27FC236}">
+                <a16:creationId xmlns:a16="http://schemas.microsoft.com/office/drawing/2014/main" id="{60162DF9-D237-46AD-9870-5AD81C394553}"/>
+              </a:ext>
+            </a:extLst>
+          </p:cNvPr>
+          <p:cNvSpPr/>
+          <p:nvPr/>
+        </p:nvSpPr>
+        <p:spPr>
+          <a:xfrm>
+            <a:off x="16497173" y="9443534"/>
+            <a:ext cx="2090057" cy="519519"/>
+          </a:xfrm>
+          <a:prstGeom prst="flowChartProcess">
+            <a:avLst/>
+          </a:prstGeom>
+        </p:spPr>
+        <p:style>
+          <a:lnRef idx="2">
+            <a:schemeClr val="accent1">
+              <a:shade val="50000"/>
+            </a:schemeClr>
+          </a:lnRef>
+          <a:fillRef idx="1">
+            <a:schemeClr val="accent1"/>
+          </a:fillRef>
+          <a:effectRef idx="0">
+            <a:schemeClr val="accent1"/>
+          </a:effectRef>
+          <a:fontRef idx="minor">
+            <a:schemeClr val="lt1"/>
+          </a:fontRef>
+        </p:style>
+        <p:txBody>
+          <a:bodyPr rtlCol="0" anchor="ctr"/>
+          <a:lstStyle/>
+          <a:p>
+            <a:pPr algn="ctr"/>
+            <a:r>
+              <a:rPr lang="en-US" dirty="0"/>
+              <a:t>WAIT for thread2 event</a:t>
+            </a:r>
+          </a:p>
+        </p:txBody>
+      </p:sp>
+      <p:sp>
+        <p:nvSpPr>
+          <p:cNvPr id="110" name="Flowchart: Process 109">
+            <a:extLst>
+              <a:ext uri="{FF2B5EF4-FFF2-40B4-BE49-F238E27FC236}">
+                <a16:creationId xmlns:a16="http://schemas.microsoft.com/office/drawing/2014/main" id="{69E058D1-CB47-4011-A663-034DC8299506}"/>
+              </a:ext>
+            </a:extLst>
+          </p:cNvPr>
+          <p:cNvSpPr/>
+          <p:nvPr/>
+        </p:nvSpPr>
+        <p:spPr>
+          <a:xfrm>
+            <a:off x="16497173" y="11575729"/>
+            <a:ext cx="2090057" cy="519519"/>
+          </a:xfrm>
+          <a:prstGeom prst="flowChartProcess">
+            <a:avLst/>
+          </a:prstGeom>
+        </p:spPr>
+        <p:style>
+          <a:lnRef idx="2">
+            <a:schemeClr val="accent1">
+              <a:shade val="50000"/>
+            </a:schemeClr>
+          </a:lnRef>
+          <a:fillRef idx="1">
+            <a:schemeClr val="accent1"/>
+          </a:fillRef>
+          <a:effectRef idx="0">
+            <a:schemeClr val="accent1"/>
+          </a:effectRef>
+          <a:fontRef idx="minor">
+            <a:schemeClr val="lt1"/>
+          </a:fontRef>
+        </p:style>
+        <p:txBody>
+          <a:bodyPr rtlCol="0" anchor="ctr"/>
+          <a:lstStyle/>
+          <a:p>
+            <a:pPr algn="ctr"/>
+            <a:r>
+              <a:rPr lang="en-US" dirty="0"/>
+              <a:t>Set Main Event to TRUE</a:t>
+            </a:r>
+          </a:p>
+        </p:txBody>
+      </p:sp>
+      <p:cxnSp>
+        <p:nvCxnSpPr>
+          <p:cNvPr id="112" name="Connector: Elbow 111">
+            <a:extLst>
+              <a:ext uri="{FF2B5EF4-FFF2-40B4-BE49-F238E27FC236}">
+                <a16:creationId xmlns:a16="http://schemas.microsoft.com/office/drawing/2014/main" id="{5F050C83-D856-49F6-881E-F6D26F2C0A36}"/>
+              </a:ext>
+            </a:extLst>
+          </p:cNvPr>
+          <p:cNvCxnSpPr>
+            <a:stCxn id="110" idx="2"/>
+            <a:endCxn id="107" idx="3"/>
+          </p:cNvCxnSpPr>
+          <p:nvPr/>
+        </p:nvCxnSpPr>
+        <p:spPr>
+          <a:xfrm rot="5400000" flipH="1" flipV="1">
+            <a:off x="14736544" y="8244563"/>
+            <a:ext cx="6656342" cy="1045027"/>
+          </a:xfrm>
+          <a:prstGeom prst="bentConnector4">
+            <a:avLst>
+              <a:gd name="adj1" fmla="val -3434"/>
+              <a:gd name="adj2" fmla="val 260247"/>
+            </a:avLst>
+          </a:prstGeom>
+          <a:ln w="38100">
+            <a:tailEnd type="triangle"/>
+          </a:ln>
+        </p:spPr>
+        <p:style>
+          <a:lnRef idx="1">
+            <a:schemeClr val="accent1"/>
+          </a:lnRef>
+          <a:fillRef idx="0">
+            <a:schemeClr val="accent1"/>
+          </a:fillRef>
+          <a:effectRef idx="0">
+            <a:schemeClr val="accent1"/>
+          </a:effectRef>
+          <a:fontRef idx="minor">
+            <a:schemeClr val="tx1"/>
+          </a:fontRef>
+        </p:style>
+      </p:cxnSp>
+      <p:cxnSp>
+        <p:nvCxnSpPr>
+          <p:cNvPr id="115" name="Connector: Elbow 114">
+            <a:extLst>
+              <a:ext uri="{FF2B5EF4-FFF2-40B4-BE49-F238E27FC236}">
+                <a16:creationId xmlns:a16="http://schemas.microsoft.com/office/drawing/2014/main" id="{A248F1A3-64B1-4DF2-91A6-124A6F878433}"/>
+              </a:ext>
+            </a:extLst>
+          </p:cNvPr>
+          <p:cNvCxnSpPr>
+            <a:stCxn id="106" idx="2"/>
+          </p:cNvCxnSpPr>
+          <p:nvPr/>
+        </p:nvCxnSpPr>
+        <p:spPr>
+          <a:xfrm rot="5400000">
+            <a:off x="16681252" y="4397811"/>
+            <a:ext cx="1662680" cy="1"/>
+          </a:xfrm>
+          <a:prstGeom prst="bentConnector3">
+            <a:avLst/>
+          </a:prstGeom>
+          <a:ln w="38100">
+            <a:tailEnd type="triangle"/>
+          </a:ln>
+        </p:spPr>
+        <p:style>
+          <a:lnRef idx="1">
+            <a:schemeClr val="accent1"/>
+          </a:lnRef>
+          <a:fillRef idx="0">
+            <a:schemeClr val="accent1"/>
+          </a:fillRef>
+          <a:effectRef idx="0">
+            <a:schemeClr val="accent1"/>
+          </a:effectRef>
+          <a:fontRef idx="minor">
+            <a:schemeClr val="tx1"/>
+          </a:fontRef>
+        </p:style>
+      </p:cxnSp>
+      <p:cxnSp>
+        <p:nvCxnSpPr>
+          <p:cNvPr id="117" name="Connector: Elbow 116">
+            <a:extLst>
+              <a:ext uri="{FF2B5EF4-FFF2-40B4-BE49-F238E27FC236}">
+                <a16:creationId xmlns:a16="http://schemas.microsoft.com/office/drawing/2014/main" id="{42DFFBA9-AE64-47CF-B8DB-FFB40A23F55E}"/>
+              </a:ext>
+            </a:extLst>
+          </p:cNvPr>
+          <p:cNvCxnSpPr>
+            <a:stCxn id="107" idx="2"/>
+          </p:cNvCxnSpPr>
+          <p:nvPr/>
+        </p:nvCxnSpPr>
+        <p:spPr>
+          <a:xfrm rot="5400000">
+            <a:off x="16717478" y="6523388"/>
+            <a:ext cx="1649446" cy="1"/>
+          </a:xfrm>
+          <a:prstGeom prst="bentConnector3">
+            <a:avLst/>
+          </a:prstGeom>
+          <a:ln w="38100">
+            <a:tailEnd type="triangle"/>
+          </a:ln>
+        </p:spPr>
+        <p:style>
+          <a:lnRef idx="1">
+            <a:schemeClr val="accent1"/>
+          </a:lnRef>
+          <a:fillRef idx="0">
+            <a:schemeClr val="accent1"/>
+          </a:fillRef>
+          <a:effectRef idx="0">
+            <a:schemeClr val="accent1"/>
+          </a:effectRef>
+          <a:fontRef idx="minor">
+            <a:schemeClr val="tx1"/>
+          </a:fontRef>
+        </p:style>
+      </p:cxnSp>
+      <p:cxnSp>
+        <p:nvCxnSpPr>
+          <p:cNvPr id="119" name="Connector: Elbow 118">
+            <a:extLst>
+              <a:ext uri="{FF2B5EF4-FFF2-40B4-BE49-F238E27FC236}">
+                <a16:creationId xmlns:a16="http://schemas.microsoft.com/office/drawing/2014/main" id="{00795708-6FAC-425F-90FE-FDB3DE070C56}"/>
+              </a:ext>
+            </a:extLst>
+          </p:cNvPr>
+          <p:cNvCxnSpPr>
+            <a:stCxn id="108" idx="2"/>
+          </p:cNvCxnSpPr>
+          <p:nvPr/>
+        </p:nvCxnSpPr>
+        <p:spPr>
+          <a:xfrm rot="5400000">
+            <a:off x="16710199" y="8662859"/>
+            <a:ext cx="1664003" cy="2"/>
+          </a:xfrm>
+          <a:prstGeom prst="bentConnector3">
+            <a:avLst/>
+          </a:prstGeom>
+          <a:ln w="38100">
+            <a:tailEnd type="triangle"/>
+          </a:ln>
+        </p:spPr>
+        <p:style>
+          <a:lnRef idx="1">
+            <a:schemeClr val="accent1"/>
+          </a:lnRef>
+          <a:fillRef idx="0">
+            <a:schemeClr val="accent1"/>
+          </a:fillRef>
+          <a:effectRef idx="0">
+            <a:schemeClr val="accent1"/>
+          </a:effectRef>
+          <a:fontRef idx="minor">
+            <a:schemeClr val="tx1"/>
+          </a:fontRef>
+        </p:style>
+      </p:cxnSp>
+      <p:cxnSp>
+        <p:nvCxnSpPr>
+          <p:cNvPr id="121" name="Connector: Elbow 120">
+            <a:extLst>
+              <a:ext uri="{FF2B5EF4-FFF2-40B4-BE49-F238E27FC236}">
+                <a16:creationId xmlns:a16="http://schemas.microsoft.com/office/drawing/2014/main" id="{C0DCD96C-C749-4C35-88DD-783B1F4B27D5}"/>
+              </a:ext>
+            </a:extLst>
+          </p:cNvPr>
+          <p:cNvCxnSpPr>
+            <a:stCxn id="109" idx="2"/>
+          </p:cNvCxnSpPr>
+          <p:nvPr/>
+        </p:nvCxnSpPr>
+        <p:spPr>
+          <a:xfrm rot="5400000">
+            <a:off x="16735864" y="10769389"/>
+            <a:ext cx="1612675" cy="3"/>
+          </a:xfrm>
+          <a:prstGeom prst="bentConnector3">
+            <a:avLst/>
+          </a:prstGeom>
+          <a:ln w="38100">
+            <a:tailEnd type="triangle"/>
+          </a:ln>
+        </p:spPr>
+        <p:style>
+          <a:lnRef idx="1">
+            <a:schemeClr val="accent1"/>
+          </a:lnRef>
+          <a:fillRef idx="0">
+            <a:schemeClr val="accent1"/>
+          </a:fillRef>
+          <a:effectRef idx="0">
+            <a:schemeClr val="accent1"/>
+          </a:effectRef>
+          <a:fontRef idx="minor">
+            <a:schemeClr val="tx1"/>
+          </a:fontRef>
+        </p:style>
+      </p:cxnSp>
+      <p:sp>
+        <p:nvSpPr>
+          <p:cNvPr id="124" name="TextBox 123">
+            <a:extLst>
+              <a:ext uri="{FF2B5EF4-FFF2-40B4-BE49-F238E27FC236}">
+                <a16:creationId xmlns:a16="http://schemas.microsoft.com/office/drawing/2014/main" id="{7D99093A-04C1-4CC0-B076-5EAA68198C4B}"/>
+              </a:ext>
+            </a:extLst>
+          </p:cNvPr>
+          <p:cNvSpPr txBox="1"/>
+          <p:nvPr/>
+        </p:nvSpPr>
+        <p:spPr>
+          <a:xfrm>
+            <a:off x="1318437" y="13864856"/>
+            <a:ext cx="13716000" cy="1107996"/>
+          </a:xfrm>
+          <a:prstGeom prst="rect">
+            <a:avLst/>
+          </a:prstGeom>
+          <a:noFill/>
+        </p:spPr>
+        <p:txBody>
+          <a:bodyPr wrap="square" rtlCol="0">
+            <a:spAutoFit/>
+          </a:bodyPr>
+          <a:lstStyle/>
+          <a:p>
+            <a:r>
+              <a:rPr lang="en-US" sz="2200" b="1" dirty="0"/>
+              <a:t>NOTE:</a:t>
+            </a:r>
+            <a:r>
+              <a:rPr lang="en-US" sz="2200" dirty="0"/>
+              <a:t> The threads in blue are the threads assigned to each </a:t>
+            </a:r>
+            <a:r>
+              <a:rPr lang="en-US" sz="2200" dirty="0" err="1"/>
+              <a:t>rfid</a:t>
+            </a:r>
+            <a:r>
+              <a:rPr lang="en-US" sz="2200" dirty="0"/>
+              <a:t> chip. This is not limited to only two threads, copy the thread for as many </a:t>
+            </a:r>
+            <a:r>
+              <a:rPr lang="en-US" sz="2200" dirty="0" err="1"/>
+              <a:t>rfid</a:t>
+            </a:r>
+            <a:r>
+              <a:rPr lang="en-US" sz="2200" dirty="0"/>
+              <a:t> chips as you have. The process is the same for each, simply add an </a:t>
+            </a:r>
+            <a:r>
+              <a:rPr lang="en-US" sz="2200" i="1" dirty="0" err="1"/>
+              <a:t>eventX.wait</a:t>
+            </a:r>
+            <a:r>
+              <a:rPr lang="en-US" sz="2200" i="1" dirty="0"/>
+              <a:t>()</a:t>
+            </a:r>
+            <a:r>
+              <a:rPr lang="en-US" sz="2200" dirty="0"/>
+              <a:t> command in the scheduling thread (purple) after the other </a:t>
+            </a:r>
+            <a:r>
+              <a:rPr lang="en-US" sz="2200" i="1" dirty="0"/>
+              <a:t>wait()</a:t>
+            </a:r>
+            <a:r>
+              <a:rPr lang="en-US" sz="2200" dirty="0"/>
+              <a:t> commands. This is meant to be a scalable architecture.</a:t>
+            </a:r>
+            <a:endParaRPr lang="en-US" sz="2200" b="1" dirty="0"/>
+          </a:p>
+        </p:txBody>
+      </p:sp>
+      <p:sp>
+        <p:nvSpPr>
+          <p:cNvPr id="125" name="TextBox 124">
+            <a:extLst>
+              <a:ext uri="{FF2B5EF4-FFF2-40B4-BE49-F238E27FC236}">
+                <a16:creationId xmlns:a16="http://schemas.microsoft.com/office/drawing/2014/main" id="{5493B97D-5FDB-4777-A0F6-0DAC973906C1}"/>
+              </a:ext>
+            </a:extLst>
+          </p:cNvPr>
+          <p:cNvSpPr txBox="1"/>
+          <p:nvPr/>
+        </p:nvSpPr>
+        <p:spPr>
+          <a:xfrm>
+            <a:off x="914400" y="340242"/>
+            <a:ext cx="19436316" cy="1246495"/>
+          </a:xfrm>
+          <a:prstGeom prst="rect">
+            <a:avLst/>
+          </a:prstGeom>
+          <a:noFill/>
+        </p:spPr>
+        <p:txBody>
+          <a:bodyPr wrap="square" rtlCol="0">
+            <a:spAutoFit/>
+          </a:bodyPr>
+          <a:lstStyle/>
+          <a:p>
+            <a:r>
+              <a:rPr lang="en-US" sz="7500" dirty="0"/>
+              <a:t>RFID Threading Flow Chart</a:t>
+            </a:r>
+          </a:p>
+        </p:txBody>
+      </p:sp>
+    </p:spTree>
+    <p:extLst>
+      <p:ext uri="{BB962C8B-B14F-4D97-AF65-F5344CB8AC3E}">
+        <p14:creationId xmlns:p14="http://schemas.microsoft.com/office/powerpoint/2010/main" val="2932622137"/>
+      </p:ext>
+    </p:extLst>
+  </p:cSld>
+  <p:clrMapOvr>
+    <a:masterClrMapping/>
+  </p:clrMapOvr>
+</p:sld>
+</file>
+
+<file path=ppt/slides/slide7.xml><?xml version="1.0" encoding="utf-8"?>
 <p:sld xmlns:a="http://schemas.openxmlformats.org/drawingml/2006/main" xmlns:r="http://schemas.openxmlformats.org/officeDocument/2006/relationships" xmlns:p="http://schemas.openxmlformats.org/presentationml/2006/main">
   <p:cSld>
     <p:spTree>

</xml_diff>

<commit_message>
Work on main doors logic
</commit_message>
<xml_diff>
--- a/Software/Software System Architecture.pptx
+++ b/Software/Software System Architecture.pptx
@@ -10,9 +10,10 @@
     <p:sldId id="260" r:id="rId4"/>
     <p:sldId id="261" r:id="rId5"/>
     <p:sldId id="263" r:id="rId6"/>
-    <p:sldId id="264" r:id="rId7"/>
-    <p:sldId id="257" r:id="rId8"/>
-    <p:sldId id="262" r:id="rId9"/>
+    <p:sldId id="265" r:id="rId7"/>
+    <p:sldId id="264" r:id="rId8"/>
+    <p:sldId id="257" r:id="rId9"/>
+    <p:sldId id="262" r:id="rId10"/>
   </p:sldIdLst>
   <p:sldSz cx="21945600" cy="16459200"/>
   <p:notesSz cx="6858000" cy="9144000"/>
@@ -121,6 +122,7 @@
             <p14:sldId id="260"/>
             <p14:sldId id="261"/>
             <p14:sldId id="263"/>
+            <p14:sldId id="265"/>
             <p14:sldId id="264"/>
             <p14:sldId id="257"/>
             <p14:sldId id="262"/>
@@ -266,7 +268,7 @@
           <a:p>
             <a:fld id="{F62E71A9-A198-4BC2-915B-5C3ABADD511E}" type="datetimeFigureOut">
               <a:rPr lang="en-US" smtClean="0"/>
-              <a:t>10/3/2019</a:t>
+              <a:t>10/9/2019</a:t>
             </a:fld>
             <a:endParaRPr lang="en-US"/>
           </a:p>
@@ -436,7 +438,7 @@
           <a:p>
             <a:fld id="{F62E71A9-A198-4BC2-915B-5C3ABADD511E}" type="datetimeFigureOut">
               <a:rPr lang="en-US" smtClean="0"/>
-              <a:t>10/3/2019</a:t>
+              <a:t>10/9/2019</a:t>
             </a:fld>
             <a:endParaRPr lang="en-US"/>
           </a:p>
@@ -616,7 +618,7 @@
           <a:p>
             <a:fld id="{F62E71A9-A198-4BC2-915B-5C3ABADD511E}" type="datetimeFigureOut">
               <a:rPr lang="en-US" smtClean="0"/>
-              <a:t>10/3/2019</a:t>
+              <a:t>10/9/2019</a:t>
             </a:fld>
             <a:endParaRPr lang="en-US"/>
           </a:p>
@@ -786,7 +788,7 @@
           <a:p>
             <a:fld id="{F62E71A9-A198-4BC2-915B-5C3ABADD511E}" type="datetimeFigureOut">
               <a:rPr lang="en-US" smtClean="0"/>
-              <a:t>10/3/2019</a:t>
+              <a:t>10/9/2019</a:t>
             </a:fld>
             <a:endParaRPr lang="en-US"/>
           </a:p>
@@ -1030,7 +1032,7 @@
           <a:p>
             <a:fld id="{F62E71A9-A198-4BC2-915B-5C3ABADD511E}" type="datetimeFigureOut">
               <a:rPr lang="en-US" smtClean="0"/>
-              <a:t>10/3/2019</a:t>
+              <a:t>10/9/2019</a:t>
             </a:fld>
             <a:endParaRPr lang="en-US"/>
           </a:p>
@@ -1262,7 +1264,7 @@
           <a:p>
             <a:fld id="{F62E71A9-A198-4BC2-915B-5C3ABADD511E}" type="datetimeFigureOut">
               <a:rPr lang="en-US" smtClean="0"/>
-              <a:t>10/3/2019</a:t>
+              <a:t>10/9/2019</a:t>
             </a:fld>
             <a:endParaRPr lang="en-US"/>
           </a:p>
@@ -1629,7 +1631,7 @@
           <a:p>
             <a:fld id="{F62E71A9-A198-4BC2-915B-5C3ABADD511E}" type="datetimeFigureOut">
               <a:rPr lang="en-US" smtClean="0"/>
-              <a:t>10/3/2019</a:t>
+              <a:t>10/9/2019</a:t>
             </a:fld>
             <a:endParaRPr lang="en-US"/>
           </a:p>
@@ -1747,7 +1749,7 @@
           <a:p>
             <a:fld id="{F62E71A9-A198-4BC2-915B-5C3ABADD511E}" type="datetimeFigureOut">
               <a:rPr lang="en-US" smtClean="0"/>
-              <a:t>10/3/2019</a:t>
+              <a:t>10/9/2019</a:t>
             </a:fld>
             <a:endParaRPr lang="en-US"/>
           </a:p>
@@ -1842,7 +1844,7 @@
           <a:p>
             <a:fld id="{F62E71A9-A198-4BC2-915B-5C3ABADD511E}" type="datetimeFigureOut">
               <a:rPr lang="en-US" smtClean="0"/>
-              <a:t>10/3/2019</a:t>
+              <a:t>10/9/2019</a:t>
             </a:fld>
             <a:endParaRPr lang="en-US"/>
           </a:p>
@@ -2119,7 +2121,7 @@
           <a:p>
             <a:fld id="{F62E71A9-A198-4BC2-915B-5C3ABADD511E}" type="datetimeFigureOut">
               <a:rPr lang="en-US" smtClean="0"/>
-              <a:t>10/3/2019</a:t>
+              <a:t>10/9/2019</a:t>
             </a:fld>
             <a:endParaRPr lang="en-US"/>
           </a:p>
@@ -2376,7 +2378,7 @@
           <a:p>
             <a:fld id="{F62E71A9-A198-4BC2-915B-5C3ABADD511E}" type="datetimeFigureOut">
               <a:rPr lang="en-US" smtClean="0"/>
-              <a:t>10/3/2019</a:t>
+              <a:t>10/9/2019</a:t>
             </a:fld>
             <a:endParaRPr lang="en-US"/>
           </a:p>
@@ -2589,7 +2591,7 @@
           <a:p>
             <a:fld id="{F62E71A9-A198-4BC2-915B-5C3ABADD511E}" type="datetimeFigureOut">
               <a:rPr lang="en-US" smtClean="0"/>
-              <a:t>10/3/2019</a:t>
+              <a:t>10/9/2019</a:t>
             </a:fld>
             <a:endParaRPr lang="en-US"/>
           </a:p>
@@ -13879,36 +13881,703 @@
       </p:grpSpPr>
       <p:sp>
         <p:nvSpPr>
-          <p:cNvPr id="6" name="Title 5">
-            <a:extLst>
-              <a:ext uri="{FF2B5EF4-FFF2-40B4-BE49-F238E27FC236}">
-                <a16:creationId xmlns:a16="http://schemas.microsoft.com/office/drawing/2014/main" id="{C2A4A3CC-D7EC-417E-B6B0-17828F675749}"/>
-              </a:ext>
-            </a:extLst>
-          </p:cNvPr>
-          <p:cNvSpPr>
-            <a:spLocks noGrp="1"/>
-          </p:cNvSpPr>
-          <p:nvPr>
-            <p:ph type="ctrTitle"/>
-          </p:nvPr>
-        </p:nvSpPr>
-        <p:spPr/>
-        <p:txBody>
-          <a:bodyPr/>
+          <p:cNvPr id="4" name="Rectangle 3">
+            <a:extLst>
+              <a:ext uri="{FF2B5EF4-FFF2-40B4-BE49-F238E27FC236}">
+                <a16:creationId xmlns:a16="http://schemas.microsoft.com/office/drawing/2014/main" id="{8910DB94-51C4-4E2D-9439-C606660827E0}"/>
+              </a:ext>
+            </a:extLst>
+          </p:cNvPr>
+          <p:cNvSpPr/>
+          <p:nvPr/>
+        </p:nvSpPr>
+        <p:spPr>
+          <a:xfrm>
+            <a:off x="956929" y="3476843"/>
+            <a:ext cx="6719777" cy="10866474"/>
+          </a:xfrm>
+          <a:prstGeom prst="rect">
+            <a:avLst/>
+          </a:prstGeom>
+          <a:solidFill>
+            <a:srgbClr val="8C3FC5">
+              <a:alpha val="70000"/>
+            </a:srgbClr>
+          </a:solidFill>
+          <a:ln>
+            <a:solidFill>
+              <a:schemeClr val="tx1"/>
+            </a:solidFill>
+          </a:ln>
+        </p:spPr>
+        <p:style>
+          <a:lnRef idx="2">
+            <a:schemeClr val="accent1">
+              <a:shade val="50000"/>
+            </a:schemeClr>
+          </a:lnRef>
+          <a:fillRef idx="1">
+            <a:schemeClr val="accent1"/>
+          </a:fillRef>
+          <a:effectRef idx="0">
+            <a:schemeClr val="accent1"/>
+          </a:effectRef>
+          <a:fontRef idx="minor">
+            <a:schemeClr val="lt1"/>
+          </a:fontRef>
+        </p:style>
+        <p:txBody>
+          <a:bodyPr rtlCol="0" anchor="ctr"/>
           <a:lstStyle/>
           <a:p>
-            <a:r>
-              <a:rPr lang="en-US" dirty="0"/>
-              <a:t>Old Slides</a:t>
-            </a:r>
-          </a:p>
-        </p:txBody>
-      </p:sp>
+            <a:pPr algn="ctr"/>
+            <a:endParaRPr lang="en-US"/>
+          </a:p>
+        </p:txBody>
+      </p:sp>
+      <p:sp>
+        <p:nvSpPr>
+          <p:cNvPr id="6" name="Rectangle 5">
+            <a:extLst>
+              <a:ext uri="{FF2B5EF4-FFF2-40B4-BE49-F238E27FC236}">
+                <a16:creationId xmlns:a16="http://schemas.microsoft.com/office/drawing/2014/main" id="{3DB47140-473A-4185-BE9C-3C207373B7FA}"/>
+              </a:ext>
+            </a:extLst>
+          </p:cNvPr>
+          <p:cNvSpPr/>
+          <p:nvPr/>
+        </p:nvSpPr>
+        <p:spPr>
+          <a:xfrm>
+            <a:off x="12408198" y="2434851"/>
+            <a:ext cx="8580473" cy="4561367"/>
+          </a:xfrm>
+          <a:prstGeom prst="rect">
+            <a:avLst/>
+          </a:prstGeom>
+          <a:solidFill>
+            <a:schemeClr val="accent1">
+              <a:alpha val="70000"/>
+            </a:schemeClr>
+          </a:solidFill>
+          <a:ln>
+            <a:solidFill>
+              <a:schemeClr val="tx1"/>
+            </a:solidFill>
+          </a:ln>
+        </p:spPr>
+        <p:style>
+          <a:lnRef idx="2">
+            <a:schemeClr val="accent1">
+              <a:shade val="50000"/>
+            </a:schemeClr>
+          </a:lnRef>
+          <a:fillRef idx="1">
+            <a:schemeClr val="accent1"/>
+          </a:fillRef>
+          <a:effectRef idx="0">
+            <a:schemeClr val="accent1"/>
+          </a:effectRef>
+          <a:fontRef idx="minor">
+            <a:schemeClr val="lt1"/>
+          </a:fontRef>
+        </p:style>
+        <p:txBody>
+          <a:bodyPr rtlCol="0" anchor="ctr"/>
+          <a:lstStyle/>
+          <a:p>
+            <a:pPr algn="ctr"/>
+            <a:endParaRPr lang="en-US"/>
+          </a:p>
+        </p:txBody>
+      </p:sp>
+      <p:sp>
+        <p:nvSpPr>
+          <p:cNvPr id="8" name="Rectangle 7">
+            <a:extLst>
+              <a:ext uri="{FF2B5EF4-FFF2-40B4-BE49-F238E27FC236}">
+                <a16:creationId xmlns:a16="http://schemas.microsoft.com/office/drawing/2014/main" id="{637DDEC4-2CC9-4E1C-A425-BA25E049A878}"/>
+              </a:ext>
+            </a:extLst>
+          </p:cNvPr>
+          <p:cNvSpPr/>
+          <p:nvPr/>
+        </p:nvSpPr>
+        <p:spPr>
+          <a:xfrm>
+            <a:off x="12408198" y="10823940"/>
+            <a:ext cx="8580473" cy="4561367"/>
+          </a:xfrm>
+          <a:prstGeom prst="rect">
+            <a:avLst/>
+          </a:prstGeom>
+          <a:solidFill>
+            <a:schemeClr val="accent1">
+              <a:alpha val="70000"/>
+            </a:schemeClr>
+          </a:solidFill>
+          <a:ln>
+            <a:solidFill>
+              <a:schemeClr val="tx1"/>
+            </a:solidFill>
+          </a:ln>
+        </p:spPr>
+        <p:style>
+          <a:lnRef idx="2">
+            <a:schemeClr val="accent1">
+              <a:shade val="50000"/>
+            </a:schemeClr>
+          </a:lnRef>
+          <a:fillRef idx="1">
+            <a:schemeClr val="accent1"/>
+          </a:fillRef>
+          <a:effectRef idx="0">
+            <a:schemeClr val="accent1"/>
+          </a:effectRef>
+          <a:fontRef idx="minor">
+            <a:schemeClr val="lt1"/>
+          </a:fontRef>
+        </p:style>
+        <p:txBody>
+          <a:bodyPr rtlCol="0" anchor="ctr"/>
+          <a:lstStyle/>
+          <a:p>
+            <a:pPr algn="ctr"/>
+            <a:endParaRPr lang="en-US"/>
+          </a:p>
+        </p:txBody>
+      </p:sp>
+      <p:sp>
+        <p:nvSpPr>
+          <p:cNvPr id="9" name="TextBox 8">
+            <a:extLst>
+              <a:ext uri="{FF2B5EF4-FFF2-40B4-BE49-F238E27FC236}">
+                <a16:creationId xmlns:a16="http://schemas.microsoft.com/office/drawing/2014/main" id="{9B0F0A09-CF79-4424-A0D1-FA594ACFB99A}"/>
+              </a:ext>
+            </a:extLst>
+          </p:cNvPr>
+          <p:cNvSpPr txBox="1"/>
+          <p:nvPr/>
+        </p:nvSpPr>
+        <p:spPr>
+          <a:xfrm>
+            <a:off x="2583710" y="8402248"/>
+            <a:ext cx="3466214" cy="1015663"/>
+          </a:xfrm>
+          <a:prstGeom prst="rect">
+            <a:avLst/>
+          </a:prstGeom>
+          <a:noFill/>
+        </p:spPr>
+        <p:txBody>
+          <a:bodyPr wrap="square" rtlCol="0" anchor="ctr">
+            <a:spAutoFit/>
+          </a:bodyPr>
+          <a:lstStyle/>
+          <a:p>
+            <a:pPr algn="ctr"/>
+            <a:r>
+              <a:rPr lang="en-US" sz="6000" dirty="0"/>
+              <a:t>2</a:t>
+            </a:r>
+          </a:p>
+        </p:txBody>
+      </p:sp>
+      <p:sp>
+        <p:nvSpPr>
+          <p:cNvPr id="10" name="TextBox 9">
+            <a:extLst>
+              <a:ext uri="{FF2B5EF4-FFF2-40B4-BE49-F238E27FC236}">
+                <a16:creationId xmlns:a16="http://schemas.microsoft.com/office/drawing/2014/main" id="{801EACFF-5F90-4B44-9B82-C12BB0637345}"/>
+              </a:ext>
+            </a:extLst>
+          </p:cNvPr>
+          <p:cNvSpPr txBox="1"/>
+          <p:nvPr/>
+        </p:nvSpPr>
+        <p:spPr>
+          <a:xfrm>
+            <a:off x="914400" y="340242"/>
+            <a:ext cx="19436316" cy="1246495"/>
+          </a:xfrm>
+          <a:prstGeom prst="rect">
+            <a:avLst/>
+          </a:prstGeom>
+          <a:noFill/>
+        </p:spPr>
+        <p:txBody>
+          <a:bodyPr wrap="square" rtlCol="0">
+            <a:spAutoFit/>
+          </a:bodyPr>
+          <a:lstStyle/>
+          <a:p>
+            <a:r>
+              <a:rPr lang="en-US" sz="7500" dirty="0"/>
+              <a:t>Cage Numbering System</a:t>
+            </a:r>
+          </a:p>
+        </p:txBody>
+      </p:sp>
+      <p:sp>
+        <p:nvSpPr>
+          <p:cNvPr id="5" name="Rectangle 4">
+            <a:extLst>
+              <a:ext uri="{FF2B5EF4-FFF2-40B4-BE49-F238E27FC236}">
+                <a16:creationId xmlns:a16="http://schemas.microsoft.com/office/drawing/2014/main" id="{81EB1DD9-6AA8-48B1-8D5C-7CDADEF35BE4}"/>
+              </a:ext>
+            </a:extLst>
+          </p:cNvPr>
+          <p:cNvSpPr/>
+          <p:nvPr/>
+        </p:nvSpPr>
+        <p:spPr>
+          <a:xfrm>
+            <a:off x="8173779" y="3476843"/>
+            <a:ext cx="3721396" cy="2477386"/>
+          </a:xfrm>
+          <a:prstGeom prst="rect">
+            <a:avLst/>
+          </a:prstGeom>
+          <a:solidFill>
+            <a:srgbClr val="00B050">
+              <a:alpha val="60000"/>
+            </a:srgbClr>
+          </a:solidFill>
+          <a:ln>
+            <a:solidFill>
+              <a:schemeClr val="tx1"/>
+            </a:solidFill>
+          </a:ln>
+        </p:spPr>
+        <p:style>
+          <a:lnRef idx="2">
+            <a:schemeClr val="accent1">
+              <a:shade val="50000"/>
+            </a:schemeClr>
+          </a:lnRef>
+          <a:fillRef idx="1">
+            <a:schemeClr val="accent1"/>
+          </a:fillRef>
+          <a:effectRef idx="0">
+            <a:schemeClr val="accent1"/>
+          </a:effectRef>
+          <a:fontRef idx="minor">
+            <a:schemeClr val="lt1"/>
+          </a:fontRef>
+        </p:style>
+        <p:txBody>
+          <a:bodyPr rtlCol="0" anchor="ctr"/>
+          <a:lstStyle/>
+          <a:p>
+            <a:pPr algn="ctr"/>
+            <a:endParaRPr lang="en-US"/>
+          </a:p>
+        </p:txBody>
+      </p:sp>
+      <p:sp>
+        <p:nvSpPr>
+          <p:cNvPr id="11" name="Rectangle: Rounded Corners 10">
+            <a:extLst>
+              <a:ext uri="{FF2B5EF4-FFF2-40B4-BE49-F238E27FC236}">
+                <a16:creationId xmlns:a16="http://schemas.microsoft.com/office/drawing/2014/main" id="{3E867CB7-5363-460A-ABD7-BCEE77DF9B07}"/>
+              </a:ext>
+            </a:extLst>
+          </p:cNvPr>
+          <p:cNvSpPr/>
+          <p:nvPr/>
+        </p:nvSpPr>
+        <p:spPr>
+          <a:xfrm>
+            <a:off x="8460863" y="4040372"/>
+            <a:ext cx="1446028" cy="1339702"/>
+          </a:xfrm>
+          <a:prstGeom prst="roundRect">
+            <a:avLst/>
+          </a:prstGeom>
+        </p:spPr>
+        <p:style>
+          <a:lnRef idx="2">
+            <a:schemeClr val="accent1">
+              <a:shade val="50000"/>
+            </a:schemeClr>
+          </a:lnRef>
+          <a:fillRef idx="1">
+            <a:schemeClr val="accent1"/>
+          </a:fillRef>
+          <a:effectRef idx="0">
+            <a:schemeClr val="accent1"/>
+          </a:effectRef>
+          <a:fontRef idx="minor">
+            <a:schemeClr val="lt1"/>
+          </a:fontRef>
+        </p:style>
+        <p:txBody>
+          <a:bodyPr rtlCol="0" anchor="ctr"/>
+          <a:lstStyle/>
+          <a:p>
+            <a:pPr algn="ctr"/>
+            <a:endParaRPr lang="en-US"/>
+          </a:p>
+        </p:txBody>
+      </p:sp>
+      <p:sp>
+        <p:nvSpPr>
+          <p:cNvPr id="12" name="Rectangle: Rounded Corners 11">
+            <a:extLst>
+              <a:ext uri="{FF2B5EF4-FFF2-40B4-BE49-F238E27FC236}">
+                <a16:creationId xmlns:a16="http://schemas.microsoft.com/office/drawing/2014/main" id="{1CD38AF0-E348-4EDF-A661-16C75EF23E52}"/>
+              </a:ext>
+            </a:extLst>
+          </p:cNvPr>
+          <p:cNvSpPr/>
+          <p:nvPr/>
+        </p:nvSpPr>
+        <p:spPr>
+          <a:xfrm>
+            <a:off x="10162063" y="4040372"/>
+            <a:ext cx="1446028" cy="1339702"/>
+          </a:xfrm>
+          <a:prstGeom prst="roundRect">
+            <a:avLst/>
+          </a:prstGeom>
+        </p:spPr>
+        <p:style>
+          <a:lnRef idx="2">
+            <a:schemeClr val="accent1">
+              <a:shade val="50000"/>
+            </a:schemeClr>
+          </a:lnRef>
+          <a:fillRef idx="1">
+            <a:schemeClr val="accent1"/>
+          </a:fillRef>
+          <a:effectRef idx="0">
+            <a:schemeClr val="accent1"/>
+          </a:effectRef>
+          <a:fontRef idx="minor">
+            <a:schemeClr val="lt1"/>
+          </a:fontRef>
+        </p:style>
+        <p:txBody>
+          <a:bodyPr rtlCol="0" anchor="ctr"/>
+          <a:lstStyle/>
+          <a:p>
+            <a:pPr algn="ctr"/>
+            <a:endParaRPr lang="en-US"/>
+          </a:p>
+        </p:txBody>
+      </p:sp>
+      <p:sp>
+        <p:nvSpPr>
+          <p:cNvPr id="15" name="Rectangle 14">
+            <a:extLst>
+              <a:ext uri="{FF2B5EF4-FFF2-40B4-BE49-F238E27FC236}">
+                <a16:creationId xmlns:a16="http://schemas.microsoft.com/office/drawing/2014/main" id="{77C5604E-A125-4ECF-A7A8-BFD615253946}"/>
+              </a:ext>
+            </a:extLst>
+          </p:cNvPr>
+          <p:cNvSpPr/>
+          <p:nvPr/>
+        </p:nvSpPr>
+        <p:spPr>
+          <a:xfrm>
+            <a:off x="8173779" y="11865930"/>
+            <a:ext cx="3721396" cy="2477386"/>
+          </a:xfrm>
+          <a:prstGeom prst="rect">
+            <a:avLst/>
+          </a:prstGeom>
+          <a:solidFill>
+            <a:srgbClr val="00B050">
+              <a:alpha val="60000"/>
+            </a:srgbClr>
+          </a:solidFill>
+          <a:ln>
+            <a:solidFill>
+              <a:schemeClr val="tx1"/>
+            </a:solidFill>
+          </a:ln>
+        </p:spPr>
+        <p:style>
+          <a:lnRef idx="2">
+            <a:schemeClr val="accent1">
+              <a:shade val="50000"/>
+            </a:schemeClr>
+          </a:lnRef>
+          <a:fillRef idx="1">
+            <a:schemeClr val="accent1"/>
+          </a:fillRef>
+          <a:effectRef idx="0">
+            <a:schemeClr val="accent1"/>
+          </a:effectRef>
+          <a:fontRef idx="minor">
+            <a:schemeClr val="lt1"/>
+          </a:fontRef>
+        </p:style>
+        <p:txBody>
+          <a:bodyPr rtlCol="0" anchor="ctr"/>
+          <a:lstStyle/>
+          <a:p>
+            <a:pPr algn="ctr"/>
+            <a:endParaRPr lang="en-US"/>
+          </a:p>
+        </p:txBody>
+      </p:sp>
+      <p:sp>
+        <p:nvSpPr>
+          <p:cNvPr id="16" name="Rectangle: Rounded Corners 15">
+            <a:extLst>
+              <a:ext uri="{FF2B5EF4-FFF2-40B4-BE49-F238E27FC236}">
+                <a16:creationId xmlns:a16="http://schemas.microsoft.com/office/drawing/2014/main" id="{EE246863-D9FF-4557-BDD8-3E4A716169B0}"/>
+              </a:ext>
+            </a:extLst>
+          </p:cNvPr>
+          <p:cNvSpPr/>
+          <p:nvPr/>
+        </p:nvSpPr>
+        <p:spPr>
+          <a:xfrm>
+            <a:off x="8460863" y="12429459"/>
+            <a:ext cx="1446028" cy="1339702"/>
+          </a:xfrm>
+          <a:prstGeom prst="roundRect">
+            <a:avLst/>
+          </a:prstGeom>
+        </p:spPr>
+        <p:style>
+          <a:lnRef idx="2">
+            <a:schemeClr val="accent1">
+              <a:shade val="50000"/>
+            </a:schemeClr>
+          </a:lnRef>
+          <a:fillRef idx="1">
+            <a:schemeClr val="accent1"/>
+          </a:fillRef>
+          <a:effectRef idx="0">
+            <a:schemeClr val="accent1"/>
+          </a:effectRef>
+          <a:fontRef idx="minor">
+            <a:schemeClr val="lt1"/>
+          </a:fontRef>
+        </p:style>
+        <p:txBody>
+          <a:bodyPr rtlCol="0" anchor="ctr"/>
+          <a:lstStyle/>
+          <a:p>
+            <a:pPr algn="ctr"/>
+            <a:endParaRPr lang="en-US"/>
+          </a:p>
+        </p:txBody>
+      </p:sp>
+      <p:sp>
+        <p:nvSpPr>
+          <p:cNvPr id="17" name="Rectangle: Rounded Corners 16">
+            <a:extLst>
+              <a:ext uri="{FF2B5EF4-FFF2-40B4-BE49-F238E27FC236}">
+                <a16:creationId xmlns:a16="http://schemas.microsoft.com/office/drawing/2014/main" id="{DC0C7F3D-5A90-4A8B-B95A-A50246170CB7}"/>
+              </a:ext>
+            </a:extLst>
+          </p:cNvPr>
+          <p:cNvSpPr/>
+          <p:nvPr/>
+        </p:nvSpPr>
+        <p:spPr>
+          <a:xfrm>
+            <a:off x="10162063" y="12429459"/>
+            <a:ext cx="1446028" cy="1339702"/>
+          </a:xfrm>
+          <a:prstGeom prst="roundRect">
+            <a:avLst/>
+          </a:prstGeom>
+        </p:spPr>
+        <p:style>
+          <a:lnRef idx="2">
+            <a:schemeClr val="accent1">
+              <a:shade val="50000"/>
+            </a:schemeClr>
+          </a:lnRef>
+          <a:fillRef idx="1">
+            <a:schemeClr val="accent1"/>
+          </a:fillRef>
+          <a:effectRef idx="0">
+            <a:schemeClr val="accent1"/>
+          </a:effectRef>
+          <a:fontRef idx="minor">
+            <a:schemeClr val="lt1"/>
+          </a:fontRef>
+        </p:style>
+        <p:txBody>
+          <a:bodyPr rtlCol="0" anchor="ctr"/>
+          <a:lstStyle/>
+          <a:p>
+            <a:pPr algn="ctr"/>
+            <a:endParaRPr lang="en-US"/>
+          </a:p>
+        </p:txBody>
+      </p:sp>
+      <p:cxnSp>
+        <p:nvCxnSpPr>
+          <p:cNvPr id="19" name="Straight Arrow Connector 18">
+            <a:extLst>
+              <a:ext uri="{FF2B5EF4-FFF2-40B4-BE49-F238E27FC236}">
+                <a16:creationId xmlns:a16="http://schemas.microsoft.com/office/drawing/2014/main" id="{71C8EE71-E105-4B1D-B7C3-BDA38CB328AE}"/>
+              </a:ext>
+            </a:extLst>
+          </p:cNvPr>
+          <p:cNvCxnSpPr>
+            <a:cxnSpLocks/>
+          </p:cNvCxnSpPr>
+          <p:nvPr/>
+        </p:nvCxnSpPr>
+        <p:spPr>
+          <a:xfrm flipH="1">
+            <a:off x="8173779" y="3104707"/>
+            <a:ext cx="3721396" cy="0"/>
+          </a:xfrm>
+          <a:prstGeom prst="straightConnector1">
+            <a:avLst/>
+          </a:prstGeom>
+          <a:ln w="63500">
+            <a:tailEnd type="triangle"/>
+          </a:ln>
+        </p:spPr>
+        <p:style>
+          <a:lnRef idx="1">
+            <a:schemeClr val="accent1"/>
+          </a:lnRef>
+          <a:fillRef idx="0">
+            <a:schemeClr val="accent1"/>
+          </a:fillRef>
+          <a:effectRef idx="0">
+            <a:schemeClr val="accent1"/>
+          </a:effectRef>
+          <a:fontRef idx="minor">
+            <a:schemeClr val="tx1"/>
+          </a:fontRef>
+        </p:style>
+      </p:cxnSp>
+      <p:cxnSp>
+        <p:nvCxnSpPr>
+          <p:cNvPr id="21" name="Straight Arrow Connector 20">
+            <a:extLst>
+              <a:ext uri="{FF2B5EF4-FFF2-40B4-BE49-F238E27FC236}">
+                <a16:creationId xmlns:a16="http://schemas.microsoft.com/office/drawing/2014/main" id="{CC1C2E4A-FE6E-4EB0-A02B-60F0CAE7988C}"/>
+              </a:ext>
+            </a:extLst>
+          </p:cNvPr>
+          <p:cNvCxnSpPr>
+            <a:cxnSpLocks/>
+          </p:cNvCxnSpPr>
+          <p:nvPr/>
+        </p:nvCxnSpPr>
+        <p:spPr>
+          <a:xfrm flipH="1">
+            <a:off x="8173779" y="11461897"/>
+            <a:ext cx="3721396" cy="0"/>
+          </a:xfrm>
+          <a:prstGeom prst="straightConnector1">
+            <a:avLst/>
+          </a:prstGeom>
+          <a:ln w="63500">
+            <a:tailEnd type="triangle"/>
+          </a:ln>
+        </p:spPr>
+        <p:style>
+          <a:lnRef idx="1">
+            <a:schemeClr val="accent1"/>
+          </a:lnRef>
+          <a:fillRef idx="0">
+            <a:schemeClr val="accent1"/>
+          </a:fillRef>
+          <a:effectRef idx="0">
+            <a:schemeClr val="accent1"/>
+          </a:effectRef>
+          <a:fontRef idx="minor">
+            <a:schemeClr val="tx1"/>
+          </a:fontRef>
+        </p:style>
+      </p:cxnSp>
+      <p:cxnSp>
+        <p:nvCxnSpPr>
+          <p:cNvPr id="23" name="Straight Arrow Connector 22">
+            <a:extLst>
+              <a:ext uri="{FF2B5EF4-FFF2-40B4-BE49-F238E27FC236}">
+                <a16:creationId xmlns:a16="http://schemas.microsoft.com/office/drawing/2014/main" id="{0D0FC1C7-B2F7-44A7-848E-5F1E94D236B7}"/>
+              </a:ext>
+            </a:extLst>
+          </p:cNvPr>
+          <p:cNvCxnSpPr/>
+          <p:nvPr/>
+        </p:nvCxnSpPr>
+        <p:spPr>
+          <a:xfrm>
+            <a:off x="8173779" y="6337005"/>
+            <a:ext cx="3721396" cy="0"/>
+          </a:xfrm>
+          <a:prstGeom prst="straightConnector1">
+            <a:avLst/>
+          </a:prstGeom>
+          <a:ln w="63500">
+            <a:tailEnd type="triangle"/>
+          </a:ln>
+        </p:spPr>
+        <p:style>
+          <a:lnRef idx="1">
+            <a:schemeClr val="accent1"/>
+          </a:lnRef>
+          <a:fillRef idx="0">
+            <a:schemeClr val="accent1"/>
+          </a:fillRef>
+          <a:effectRef idx="0">
+            <a:schemeClr val="accent1"/>
+          </a:effectRef>
+          <a:fontRef idx="minor">
+            <a:schemeClr val="tx1"/>
+          </a:fontRef>
+        </p:style>
+      </p:cxnSp>
+      <p:cxnSp>
+        <p:nvCxnSpPr>
+          <p:cNvPr id="24" name="Straight Arrow Connector 23">
+            <a:extLst>
+              <a:ext uri="{FF2B5EF4-FFF2-40B4-BE49-F238E27FC236}">
+                <a16:creationId xmlns:a16="http://schemas.microsoft.com/office/drawing/2014/main" id="{4C655B81-5D75-46E3-AAED-E4A3B03AF8DE}"/>
+              </a:ext>
+            </a:extLst>
+          </p:cNvPr>
+          <p:cNvCxnSpPr/>
+          <p:nvPr/>
+        </p:nvCxnSpPr>
+        <p:spPr>
+          <a:xfrm>
+            <a:off x="8173779" y="14694196"/>
+            <a:ext cx="3721396" cy="0"/>
+          </a:xfrm>
+          <a:prstGeom prst="straightConnector1">
+            <a:avLst/>
+          </a:prstGeom>
+          <a:ln w="63500">
+            <a:tailEnd type="triangle"/>
+          </a:ln>
+        </p:spPr>
+        <p:style>
+          <a:lnRef idx="1">
+            <a:schemeClr val="accent1"/>
+          </a:lnRef>
+          <a:fillRef idx="0">
+            <a:schemeClr val="accent1"/>
+          </a:fillRef>
+          <a:effectRef idx="0">
+            <a:schemeClr val="accent1"/>
+          </a:effectRef>
+          <a:fontRef idx="minor">
+            <a:schemeClr val="tx1"/>
+          </a:fontRef>
+        </p:style>
+      </p:cxnSp>
     </p:spTree>
     <p:extLst>
       <p:ext uri="{BB962C8B-B14F-4D97-AF65-F5344CB8AC3E}">
-        <p14:creationId xmlns:p14="http://schemas.microsoft.com/office/powerpoint/2010/main" val="799690724"/>
+        <p14:creationId xmlns:p14="http://schemas.microsoft.com/office/powerpoint/2010/main" val="2988699478"/>
       </p:ext>
     </p:extLst>
   </p:cSld>
@@ -13937,6 +14606,64 @@
       </p:grpSpPr>
       <p:sp>
         <p:nvSpPr>
+          <p:cNvPr id="6" name="Title 5">
+            <a:extLst>
+              <a:ext uri="{FF2B5EF4-FFF2-40B4-BE49-F238E27FC236}">
+                <a16:creationId xmlns:a16="http://schemas.microsoft.com/office/drawing/2014/main" id="{C2A4A3CC-D7EC-417E-B6B0-17828F675749}"/>
+              </a:ext>
+            </a:extLst>
+          </p:cNvPr>
+          <p:cNvSpPr>
+            <a:spLocks noGrp="1"/>
+          </p:cNvSpPr>
+          <p:nvPr>
+            <p:ph type="ctrTitle"/>
+          </p:nvPr>
+        </p:nvSpPr>
+        <p:spPr/>
+        <p:txBody>
+          <a:bodyPr/>
+          <a:lstStyle/>
+          <a:p>
+            <a:r>
+              <a:rPr lang="en-US" dirty="0"/>
+              <a:t>Old Slides</a:t>
+            </a:r>
+          </a:p>
+        </p:txBody>
+      </p:sp>
+    </p:spTree>
+    <p:extLst>
+      <p:ext uri="{BB962C8B-B14F-4D97-AF65-F5344CB8AC3E}">
+        <p14:creationId xmlns:p14="http://schemas.microsoft.com/office/powerpoint/2010/main" val="799690724"/>
+      </p:ext>
+    </p:extLst>
+  </p:cSld>
+  <p:clrMapOvr>
+    <a:masterClrMapping/>
+  </p:clrMapOvr>
+</p:sld>
+</file>
+
+<file path=ppt/slides/slide8.xml><?xml version="1.0" encoding="utf-8"?>
+<p:sld xmlns:a="http://schemas.openxmlformats.org/drawingml/2006/main" xmlns:r="http://schemas.openxmlformats.org/officeDocument/2006/relationships" xmlns:p="http://schemas.openxmlformats.org/presentationml/2006/main">
+  <p:cSld>
+    <p:spTree>
+      <p:nvGrpSpPr>
+        <p:cNvPr id="1" name=""/>
+        <p:cNvGrpSpPr/>
+        <p:nvPr/>
+      </p:nvGrpSpPr>
+      <p:grpSpPr>
+        <a:xfrm>
+          <a:off x="0" y="0"/>
+          <a:ext cx="0" cy="0"/>
+          <a:chOff x="0" y="0"/>
+          <a:chExt cx="0" cy="0"/>
+        </a:xfrm>
+      </p:grpSpPr>
+      <p:sp>
+        <p:nvSpPr>
           <p:cNvPr id="4" name="Flowchart: Decision 3">
             <a:extLst>
               <a:ext uri="{FF2B5EF4-FFF2-40B4-BE49-F238E27FC236}">
@@ -14178,7 +14905,7 @@
 </p:sld>
 </file>
 
-<file path=ppt/slides/slide8.xml><?xml version="1.0" encoding="utf-8"?>
+<file path=ppt/slides/slide9.xml><?xml version="1.0" encoding="utf-8"?>
 <p:sld xmlns:a="http://schemas.openxmlformats.org/drawingml/2006/main" xmlns:r="http://schemas.openxmlformats.org/officeDocument/2006/relationships" xmlns:p="http://schemas.openxmlformats.org/presentationml/2006/main">
   <p:cSld>
     <p:spTree>

</xml_diff>